<commit_message>
updated presentation from chesee
</commit_message>
<xml_diff>
--- a/trunk/doc/Presentation.pptx
+++ b/trunk/doc/Presentation.pptx
@@ -5,10 +5,10 @@
     <p:sldMasterId id="2147483669" r:id="rId4"/>
   </p:sldMasterIdLst>
   <p:notesMasterIdLst>
-    <p:notesMasterId r:id="rId16"/>
+    <p:notesMasterId r:id="rId18"/>
   </p:notesMasterIdLst>
   <p:handoutMasterIdLst>
-    <p:handoutMasterId r:id="rId17"/>
+    <p:handoutMasterId r:id="rId19"/>
   </p:handoutMasterIdLst>
   <p:sldIdLst>
     <p:sldId id="256" r:id="rId5"/>
@@ -16,12 +16,14 @@
     <p:sldId id="263" r:id="rId7"/>
     <p:sldId id="258" r:id="rId8"/>
     <p:sldId id="265" r:id="rId9"/>
-    <p:sldId id="275" r:id="rId10"/>
-    <p:sldId id="276" r:id="rId11"/>
-    <p:sldId id="273" r:id="rId12"/>
-    <p:sldId id="274" r:id="rId13"/>
-    <p:sldId id="277" r:id="rId14"/>
-    <p:sldId id="266" r:id="rId15"/>
+    <p:sldId id="278" r:id="rId10"/>
+    <p:sldId id="279" r:id="rId11"/>
+    <p:sldId id="275" r:id="rId12"/>
+    <p:sldId id="276" r:id="rId13"/>
+    <p:sldId id="273" r:id="rId14"/>
+    <p:sldId id="274" r:id="rId15"/>
+    <p:sldId id="277" r:id="rId16"/>
+    <p:sldId id="266" r:id="rId17"/>
   </p:sldIdLst>
   <p:sldSz cx="9144000" cy="6858000" type="screen4x3"/>
   <p:notesSz cx="6797675" cy="9872663"/>
@@ -239,7 +241,7 @@
           <a:p>
             <a:fld id="{EFA0D184-D464-48E9-9CA0-A94E873F6C2C}" type="datetimeFigureOut">
               <a:rPr lang="de-CH" smtClean="0"/>
-              <a:t>10.01.2015</a:t>
+              <a:t>10.01.15</a:t>
             </a:fld>
             <a:endParaRPr lang="de-CH"/>
           </a:p>
@@ -305,7 +307,7 @@
           <a:p>
             <a:fld id="{5F377753-DB7C-4FA7-98FC-17681D88797A}" type="slidenum">
               <a:rPr lang="de-CH" smtClean="0"/>
-              <a:t>‹#›</a:t>
+              <a:t>‹Nr.›</a:t>
             </a:fld>
             <a:endParaRPr lang="de-CH"/>
           </a:p>
@@ -409,7 +411,7 @@
           <a:p>
             <a:fld id="{5AF2B663-2BA9-4D7E-8201-5DE4109E1EDD}" type="datetimeFigureOut">
               <a:rPr lang="de-CH" smtClean="0"/>
-              <a:t>10.01.2015</a:t>
+              <a:t>10.01.15</a:t>
             </a:fld>
             <a:endParaRPr lang="de-CH"/>
           </a:p>
@@ -568,7 +570,7 @@
           <a:p>
             <a:fld id="{37E44704-8E6D-4CF2-8CFA-A0F7BC751896}" type="slidenum">
               <a:rPr lang="de-CH" smtClean="0"/>
-              <a:t>‹#›</a:t>
+              <a:t>‹Nr.›</a:t>
             </a:fld>
             <a:endParaRPr lang="de-CH"/>
           </a:p>
@@ -1009,14 +1011,14 @@
             <a:noFill/>
           </a:ln>
           <a:extLst>
-            <a:ext uri="{909E8E84-426E-40DD-AFC4-6F175D3DCCD1}">
+            <a:ext uri="{909E8E84-426E-40dd-AFC4-6F175D3DCCD1}">
               <a14:hiddenFill xmlns:a14="http://schemas.microsoft.com/office/drawing/2010/main">
                 <a:solidFill>
                   <a:srgbClr val="FFFFFF"/>
                 </a:solidFill>
               </a14:hiddenFill>
             </a:ext>
-            <a:ext uri="{91240B29-F687-4F45-9708-019B960494DF}">
+            <a:ext uri="{91240B29-F687-4f45-9708-019B960494DF}">
               <a14:hiddenLine xmlns:a14="http://schemas.microsoft.com/office/drawing/2010/main" w="9525">
                 <a:solidFill>
                   <a:srgbClr val="000000"/>
@@ -1432,7 +1434,7 @@
   <p:timing>
     <p:tnLst>
       <p:par>
-        <p:cTn id="1" dur="indefinite" restart="never" nodeType="tmRoot"/>
+        <p:cTn xmlns:p14="http://schemas.microsoft.com/office/powerpoint/2010/main" id="1" dur="indefinite" restart="never" nodeType="tmRoot"/>
       </p:par>
     </p:tnLst>
   </p:timing>
@@ -2135,7 +2137,7 @@
           <a:p>
             <a:fld id="{F19AE9A8-34D4-4E8C-BE9C-13C550F1BED0}" type="slidenum">
               <a:rPr lang="de-CH" smtClean="0"/>
-              <a:t>‹#›</a:t>
+              <a:t>‹Nr.›</a:t>
             </a:fld>
             <a:endParaRPr lang="de-CH" dirty="0"/>
           </a:p>
@@ -2188,7 +2190,7 @@
           <a:p>
             <a:fld id="{F19AE9A8-34D4-4E8C-BE9C-13C550F1BED0}" type="slidenum">
               <a:rPr lang="de-CH" smtClean="0"/>
-              <a:t>‹#›</a:t>
+              <a:t>‹Nr.›</a:t>
             </a:fld>
             <a:endParaRPr lang="de-CH" dirty="0"/>
           </a:p>
@@ -2490,14 +2492,14 @@
             <a:noFill/>
           </a:ln>
           <a:extLst>
-            <a:ext uri="{909E8E84-426E-40DD-AFC4-6F175D3DCCD1}">
+            <a:ext uri="{909E8E84-426E-40dd-AFC4-6F175D3DCCD1}">
               <a14:hiddenFill xmlns:a14="http://schemas.microsoft.com/office/drawing/2010/main">
                 <a:solidFill>
                   <a:srgbClr val="FFFFFF"/>
                 </a:solidFill>
               </a14:hiddenFill>
             </a:ext>
-            <a:ext uri="{91240B29-F687-4F45-9708-019B960494DF}">
+            <a:ext uri="{91240B29-F687-4f45-9708-019B960494DF}">
               <a14:hiddenLine xmlns:a14="http://schemas.microsoft.com/office/drawing/2010/main" w="9525">
                 <a:solidFill>
                   <a:srgbClr val="000000"/>
@@ -2884,7 +2886,7 @@
   <p:timing>
     <p:tnLst>
       <p:par>
-        <p:cTn id="1" dur="indefinite" restart="never" nodeType="tmRoot"/>
+        <p:cTn xmlns:p14="http://schemas.microsoft.com/office/powerpoint/2010/main" id="1" dur="indefinite" restart="never" nodeType="tmRoot"/>
       </p:par>
     </p:tnLst>
   </p:timing>
@@ -3261,7 +3263,7 @@
           <a:p>
             <a:fld id="{F19AE9A8-34D4-4E8C-BE9C-13C550F1BED0}" type="slidenum">
               <a:rPr lang="de-CH" smtClean="0"/>
-              <a:t>‹#›</a:t>
+              <a:t>‹Nr.›</a:t>
             </a:fld>
             <a:endParaRPr lang="de-CH" dirty="0"/>
           </a:p>
@@ -3280,7 +3282,7 @@
   <p:timing>
     <p:tnLst>
       <p:par>
-        <p:cTn id="1" dur="indefinite" restart="never" nodeType="tmRoot"/>
+        <p:cTn xmlns:p14="http://schemas.microsoft.com/office/powerpoint/2010/main" id="1" dur="indefinite" restart="never" nodeType="tmRoot"/>
       </p:par>
     </p:tnLst>
   </p:timing>
@@ -3657,7 +3659,7 @@
           <a:p>
             <a:fld id="{F19AE9A8-34D4-4E8C-BE9C-13C550F1BED0}" type="slidenum">
               <a:rPr lang="de-CH" smtClean="0"/>
-              <a:t>‹#›</a:t>
+              <a:t>‹Nr.›</a:t>
             </a:fld>
             <a:endParaRPr lang="de-CH" dirty="0"/>
           </a:p>
@@ -3676,7 +3678,7 @@
   <p:timing>
     <p:tnLst>
       <p:par>
-        <p:cTn id="1" dur="indefinite" restart="never" nodeType="tmRoot"/>
+        <p:cTn xmlns:p14="http://schemas.microsoft.com/office/powerpoint/2010/main" id="1" dur="indefinite" restart="never" nodeType="tmRoot"/>
       </p:par>
     </p:tnLst>
   </p:timing>
@@ -3891,7 +3893,7 @@
           <a:p>
             <a:fld id="{F19AE9A8-34D4-4E8C-BE9C-13C550F1BED0}" type="slidenum">
               <a:rPr lang="de-CH" smtClean="0"/>
-              <a:t>‹#›</a:t>
+              <a:t>‹Nr.›</a:t>
             </a:fld>
             <a:endParaRPr lang="de-CH" dirty="0"/>
           </a:p>
@@ -3910,7 +3912,7 @@
   <p:timing>
     <p:tnLst>
       <p:par>
-        <p:cTn id="1" dur="indefinite" restart="never" nodeType="tmRoot"/>
+        <p:cTn xmlns:p14="http://schemas.microsoft.com/office/powerpoint/2010/main" id="1" dur="indefinite" restart="never" nodeType="tmRoot"/>
       </p:par>
     </p:tnLst>
   </p:timing>
@@ -4200,7 +4202,7 @@
           <a:p>
             <a:fld id="{F19AE9A8-34D4-4E8C-BE9C-13C550F1BED0}" type="slidenum">
               <a:rPr lang="de-CH" smtClean="0"/>
-              <a:t>‹#›</a:t>
+              <a:t>‹Nr.›</a:t>
             </a:fld>
             <a:endParaRPr lang="de-CH" dirty="0"/>
           </a:p>
@@ -4219,7 +4221,7 @@
   <p:timing>
     <p:tnLst>
       <p:par>
-        <p:cTn id="1" dur="indefinite" restart="never" nodeType="tmRoot"/>
+        <p:cTn xmlns:p14="http://schemas.microsoft.com/office/powerpoint/2010/main" id="1" dur="indefinite" restart="never" nodeType="tmRoot"/>
       </p:par>
     </p:tnLst>
   </p:timing>
@@ -4730,7 +4732,7 @@
           <a:p>
             <a:fld id="{F19AE9A8-34D4-4E8C-BE9C-13C550F1BED0}" type="slidenum">
               <a:rPr lang="de-CH" smtClean="0"/>
-              <a:t>‹#›</a:t>
+              <a:t>‹Nr.›</a:t>
             </a:fld>
             <a:endParaRPr lang="de-CH" dirty="0"/>
           </a:p>
@@ -4749,7 +4751,7 @@
   <p:timing>
     <p:tnLst>
       <p:par>
-        <p:cTn id="1" dur="indefinite" restart="never" nodeType="tmRoot"/>
+        <p:cTn xmlns:p14="http://schemas.microsoft.com/office/powerpoint/2010/main" id="1" dur="indefinite" restart="never" nodeType="tmRoot"/>
       </p:par>
     </p:tnLst>
   </p:timing>
@@ -5260,7 +5262,7 @@
           <a:p>
             <a:fld id="{F19AE9A8-34D4-4E8C-BE9C-13C550F1BED0}" type="slidenum">
               <a:rPr lang="de-CH" smtClean="0"/>
-              <a:t>‹#›</a:t>
+              <a:t>‹Nr.›</a:t>
             </a:fld>
             <a:endParaRPr lang="de-CH" dirty="0"/>
           </a:p>
@@ -5279,7 +5281,7 @@
   <p:timing>
     <p:tnLst>
       <p:par>
-        <p:cTn id="1" dur="indefinite" restart="never" nodeType="tmRoot"/>
+        <p:cTn xmlns:p14="http://schemas.microsoft.com/office/powerpoint/2010/main" id="1" dur="indefinite" restart="never" nodeType="tmRoot"/>
       </p:par>
     </p:tnLst>
   </p:timing>
@@ -5987,7 +5989,7 @@
           <a:p>
             <a:fld id="{F19AE9A8-34D4-4E8C-BE9C-13C550F1BED0}" type="slidenum">
               <a:rPr lang="de-CH" smtClean="0"/>
-              <a:t>‹#›</a:t>
+              <a:t>‹Nr.›</a:t>
             </a:fld>
             <a:endParaRPr lang="de-CH" dirty="0"/>
           </a:p>
@@ -6052,14 +6054,14 @@
             <a:noFill/>
           </a:ln>
           <a:extLst>
-            <a:ext uri="{909E8E84-426E-40DD-AFC4-6F175D3DCCD1}">
+            <a:ext uri="{909E8E84-426E-40dd-AFC4-6F175D3DCCD1}">
               <a14:hiddenFill xmlns:a14="http://schemas.microsoft.com/office/drawing/2010/main">
                 <a:solidFill>
                   <a:srgbClr val="FFFFFF"/>
                 </a:solidFill>
               </a14:hiddenFill>
             </a:ext>
-            <a:ext uri="{91240B29-F687-4F45-9708-019B960494DF}">
+            <a:ext uri="{91240B29-F687-4f45-9708-019B960494DF}">
               <a14:hiddenLine xmlns:a14="http://schemas.microsoft.com/office/drawing/2010/main" w="9525">
                 <a:solidFill>
                   <a:srgbClr val="000000"/>
@@ -6373,7 +6375,7 @@
             <a:fld id="{F19AE9A8-34D4-4E8C-BE9C-13C550F1BED0}" type="slidenum">
               <a:rPr lang="de-CH" smtClean="0"/>
               <a:pPr/>
-              <a:t>‹#›</a:t>
+              <a:t>‹Nr.›</a:t>
             </a:fld>
             <a:endParaRPr lang="de-CH" dirty="0"/>
           </a:p>
@@ -6398,7 +6400,7 @@
   <p:timing>
     <p:tnLst>
       <p:par>
-        <p:cTn id="1" dur="indefinite" restart="never" nodeType="tmRoot"/>
+        <p:cTn xmlns:p14="http://schemas.microsoft.com/office/powerpoint/2010/main" id="1" dur="indefinite" restart="never" nodeType="tmRoot"/>
       </p:par>
     </p:tnLst>
   </p:timing>
@@ -6835,14 +6837,14 @@
           </a:xfrm>
           <a:noFill/>
           <a:extLst>
-            <a:ext uri="{909E8E84-426E-40DD-AFC4-6F175D3DCCD1}">
+            <a:ext uri="{909E8E84-426E-40dd-AFC4-6F175D3DCCD1}">
               <a14:hiddenFill xmlns:a14="http://schemas.microsoft.com/office/drawing/2010/main">
                 <a:solidFill>
                   <a:srgbClr val="FFFFFF"/>
                 </a:solidFill>
               </a14:hiddenFill>
             </a:ext>
-            <a:ext uri="{91240B29-F687-4F45-9708-019B960494DF}">
+            <a:ext uri="{91240B29-F687-4f45-9708-019B960494DF}">
               <a14:hiddenLine xmlns:a14="http://schemas.microsoft.com/office/drawing/2010/main" w="9525">
                 <a:solidFill>
                   <a:srgbClr val="000000"/>
@@ -6922,14 +6924,14 @@
           </a:xfrm>
           <a:noFill/>
           <a:extLst>
-            <a:ext uri="{909E8E84-426E-40DD-AFC4-6F175D3DCCD1}">
+            <a:ext uri="{909E8E84-426E-40dd-AFC4-6F175D3DCCD1}">
               <a14:hiddenFill xmlns:a14="http://schemas.microsoft.com/office/drawing/2010/main">
                 <a:solidFill>
                   <a:srgbClr val="FFFFFF"/>
                 </a:solidFill>
               </a14:hiddenFill>
             </a:ext>
-            <a:ext uri="{91240B29-F687-4F45-9708-019B960494DF}">
+            <a:ext uri="{91240B29-F687-4f45-9708-019B960494DF}">
               <a14:hiddenLine xmlns:a14="http://schemas.microsoft.com/office/drawing/2010/main" w="9525">
                 <a:solidFill>
                   <a:srgbClr val="000000"/>
@@ -7006,14 +7008,14 @@
           </a:xfrm>
           <a:noFill/>
           <a:extLst>
-            <a:ext uri="{909E8E84-426E-40DD-AFC4-6F175D3DCCD1}">
+            <a:ext uri="{909E8E84-426E-40dd-AFC4-6F175D3DCCD1}">
               <a14:hiddenFill xmlns:a14="http://schemas.microsoft.com/office/drawing/2010/main">
                 <a:solidFill>
                   <a:srgbClr val="FFFFFF"/>
                 </a:solidFill>
               </a14:hiddenFill>
             </a:ext>
-            <a:ext uri="{91240B29-F687-4F45-9708-019B960494DF}">
+            <a:ext uri="{91240B29-F687-4f45-9708-019B960494DF}">
               <a14:hiddenLine xmlns:a14="http://schemas.microsoft.com/office/drawing/2010/main" w="9525">
                 <a:solidFill>
                   <a:srgbClr val="000000"/>
@@ -7085,7 +7087,7 @@
   <p:timing>
     <p:tnLst>
       <p:par>
-        <p:cTn id="1" dur="indefinite" restart="never" nodeType="tmRoot"/>
+        <p:cTn xmlns:p14="http://schemas.microsoft.com/office/powerpoint/2010/main" id="1" dur="indefinite" restart="never" nodeType="tmRoot"/>
       </p:par>
     </p:tnLst>
   </p:timing>
@@ -7111,7 +7113,7 @@
       </p:grpSpPr>
       <p:sp>
         <p:nvSpPr>
-          <p:cNvPr id="2" name="Content Placeholder 1"/>
+          <p:cNvPr id="2" name="Inhaltsplatzhalter 1"/>
           <p:cNvSpPr>
             <a:spLocks noGrp="1"/>
           </p:cNvSpPr>
@@ -7125,46 +7127,153 @@
           <a:lstStyle/>
           <a:p>
             <a:r>
-              <a:rPr lang="en-US" dirty="0" smtClean="0"/>
-              <a:t>What we liked </a:t>
+              <a:rPr lang="de-CH" dirty="0" smtClean="0"/>
+              <a:t>Martin</a:t>
             </a:r>
           </a:p>
           <a:p>
             <a:pPr lvl="1"/>
             <a:r>
-              <a:rPr lang="en-US" dirty="0" smtClean="0"/>
-              <a:t>Despite of the given technologies to use there was enough space for individual implementation</a:t>
-            </a:r>
-          </a:p>
-          <a:p>
-            <a:endParaRPr lang="en-US" dirty="0"/>
-          </a:p>
-          <a:p>
-            <a:r>
-              <a:rPr lang="en-US" dirty="0" smtClean="0"/>
-              <a:t>What we didn’t like so much…</a:t>
+              <a:rPr lang="de-CH" dirty="0" smtClean="0"/>
+              <a:t>Core Applikation</a:t>
             </a:r>
           </a:p>
           <a:p>
             <a:pPr lvl="1"/>
             <a:r>
-              <a:rPr lang="en-US" dirty="0" smtClean="0"/>
-              <a:t>the effort to replace the implementation of a feature with another technology required too much time in some cases</a:t>
-            </a:r>
+              <a:rPr lang="de-CH" dirty="0" smtClean="0"/>
+              <a:t>Search </a:t>
+            </a:r>
+            <a:r>
+              <a:rPr lang="de-CH" dirty="0" err="1" smtClean="0"/>
+              <a:t>view</a:t>
+            </a:r>
+            <a:r>
+              <a:rPr lang="de-CH" dirty="0" smtClean="0"/>
+              <a:t> </a:t>
+            </a:r>
+            <a:r>
+              <a:rPr lang="de-CH" dirty="0" err="1" smtClean="0"/>
+              <a:t>and</a:t>
+            </a:r>
+            <a:r>
+              <a:rPr lang="de-CH" dirty="0" smtClean="0"/>
+              <a:t> </a:t>
+            </a:r>
+            <a:r>
+              <a:rPr lang="de-CH" dirty="0" err="1" smtClean="0"/>
+              <a:t>genre</a:t>
+            </a:r>
+            <a:r>
+              <a:rPr lang="de-CH" dirty="0"/>
+              <a:t> </a:t>
+            </a:r>
+            <a:r>
+              <a:rPr lang="de-CH" dirty="0" err="1"/>
+              <a:t>v</a:t>
+            </a:r>
+            <a:r>
+              <a:rPr lang="de-CH" dirty="0" err="1" smtClean="0"/>
+              <a:t>iew</a:t>
+            </a:r>
+            <a:endParaRPr lang="de-CH" dirty="0" smtClean="0"/>
           </a:p>
           <a:p>
             <a:pPr lvl="1"/>
-            <a:endParaRPr lang="en-US" dirty="0" smtClean="0"/>
+            <a:r>
+              <a:rPr lang="de-CH" dirty="0" smtClean="0"/>
+              <a:t>AJAX </a:t>
+            </a:r>
+            <a:r>
+              <a:rPr lang="de-CH" dirty="0" err="1" smtClean="0"/>
+              <a:t>Requests</a:t>
+            </a:r>
+            <a:r>
+              <a:rPr lang="de-CH" dirty="0" smtClean="0"/>
+              <a:t> </a:t>
+            </a:r>
+            <a:r>
+              <a:rPr lang="de-CH" dirty="0" err="1" smtClean="0"/>
+              <a:t>and</a:t>
+            </a:r>
+            <a:r>
+              <a:rPr lang="de-CH" dirty="0" smtClean="0"/>
+              <a:t> CSS </a:t>
+            </a:r>
+            <a:r>
+              <a:rPr lang="de-CH" dirty="0" err="1" smtClean="0"/>
+              <a:t>finalizing</a:t>
+            </a:r>
+            <a:endParaRPr lang="de-CH" dirty="0"/>
           </a:p>
           <a:p>
             <a:pPr lvl="1"/>
-            <a:endParaRPr lang="en-US" dirty="0"/>
-          </a:p>
-        </p:txBody>
-      </p:sp>
-      <p:sp>
-        <p:nvSpPr>
-          <p:cNvPr id="3" name="Title 2"/>
+            <a:r>
+              <a:rPr lang="de-CH" dirty="0" smtClean="0"/>
+              <a:t>(Emotional Support)</a:t>
+            </a:r>
+            <a:endParaRPr lang="de-CH" dirty="0" smtClean="0"/>
+          </a:p>
+          <a:p>
+            <a:r>
+              <a:rPr lang="de-CH" dirty="0" smtClean="0"/>
+              <a:t>Fabian</a:t>
+            </a:r>
+          </a:p>
+          <a:p>
+            <a:pPr lvl="1"/>
+            <a:r>
+              <a:rPr lang="de-CH" dirty="0" smtClean="0"/>
+              <a:t>Shopping </a:t>
+            </a:r>
+            <a:r>
+              <a:rPr lang="de-CH" dirty="0" err="1" smtClean="0"/>
+              <a:t>cart</a:t>
+            </a:r>
+            <a:r>
+              <a:rPr lang="de-CH" dirty="0" smtClean="0"/>
+              <a:t> &amp; </a:t>
+            </a:r>
+            <a:r>
+              <a:rPr lang="de-CH" dirty="0" err="1" smtClean="0"/>
+              <a:t>ordering</a:t>
+            </a:r>
+            <a:endParaRPr lang="de-CH" dirty="0" smtClean="0"/>
+          </a:p>
+          <a:p>
+            <a:pPr lvl="1"/>
+            <a:r>
+              <a:rPr lang="de-CH" dirty="0" smtClean="0"/>
+              <a:t>CSS</a:t>
+            </a:r>
+          </a:p>
+          <a:p>
+            <a:r>
+              <a:rPr lang="de-CH" dirty="0" smtClean="0"/>
+              <a:t>Marcel</a:t>
+            </a:r>
+          </a:p>
+          <a:p>
+            <a:pPr lvl="1"/>
+            <a:r>
+              <a:rPr lang="de-CH" dirty="0"/>
+              <a:t>_________</a:t>
+            </a:r>
+          </a:p>
+          <a:p>
+            <a:endParaRPr lang="de-CH" dirty="0" smtClean="0"/>
+          </a:p>
+          <a:p>
+            <a:endParaRPr lang="de-CH" dirty="0" smtClean="0"/>
+          </a:p>
+          <a:p>
+            <a:endParaRPr lang="de-CH" dirty="0"/>
+          </a:p>
+        </p:txBody>
+      </p:sp>
+      <p:sp>
+        <p:nvSpPr>
+          <p:cNvPr id="3" name="Titel 2"/>
           <p:cNvSpPr>
             <a:spLocks noGrp="1"/>
           </p:cNvSpPr>
@@ -7178,17 +7287,37 @@
           <a:lstStyle/>
           <a:p>
             <a:r>
-              <a:rPr lang="en-US" dirty="0" smtClean="0"/>
-              <a:t>Lessons learnt &amp; Review</a:t>
-            </a:r>
-            <a:endParaRPr lang="en-US" dirty="0"/>
+              <a:rPr lang="de-CH" dirty="0"/>
+              <a:t>Distribution </a:t>
+            </a:r>
+            <a:r>
+              <a:rPr lang="de-CH" dirty="0" err="1"/>
+              <a:t>among</a:t>
+            </a:r>
+            <a:r>
+              <a:rPr lang="de-CH" dirty="0"/>
+              <a:t> </a:t>
+            </a:r>
+            <a:r>
+              <a:rPr lang="de-CH" dirty="0" err="1"/>
+              <a:t>the</a:t>
+            </a:r>
+            <a:r>
+              <a:rPr lang="de-CH" dirty="0"/>
+              <a:t> </a:t>
+            </a:r>
+            <a:r>
+              <a:rPr lang="de-CH" dirty="0" err="1"/>
+              <a:t>team</a:t>
+            </a:r>
+            <a:endParaRPr lang="de-CH" dirty="0"/>
           </a:p>
         </p:txBody>
       </p:sp>
     </p:spTree>
     <p:extLst>
       <p:ext uri="{BB962C8B-B14F-4D97-AF65-F5344CB8AC3E}">
-        <p14:creationId xmlns:p14="http://schemas.microsoft.com/office/powerpoint/2010/main" val="4053086936"/>
+        <p14:creationId xmlns:p14="http://schemas.microsoft.com/office/powerpoint/2010/main" val="1401125318"/>
       </p:ext>
     </p:extLst>
   </p:cSld>
@@ -7198,7 +7327,7 @@
   <p:timing>
     <p:tnLst>
       <p:par>
-        <p:cTn id="1" dur="indefinite" restart="never" nodeType="tmRoot"/>
+        <p:cTn xmlns:p14="http://schemas.microsoft.com/office/powerpoint/2010/main" id="1" dur="indefinite" restart="never" nodeType="tmRoot"/>
       </p:par>
     </p:tnLst>
   </p:timing>
@@ -7224,6 +7353,266 @@
       </p:grpSpPr>
       <p:sp>
         <p:nvSpPr>
+          <p:cNvPr id="2" name="Content Placeholder 1"/>
+          <p:cNvSpPr>
+            <a:spLocks noGrp="1"/>
+          </p:cNvSpPr>
+          <p:nvPr>
+            <p:ph sz="half" idx="1"/>
+          </p:nvPr>
+        </p:nvSpPr>
+        <p:spPr/>
+        <p:txBody>
+          <a:bodyPr/>
+          <a:lstStyle/>
+          <a:p>
+            <a:r>
+              <a:rPr lang="en-US" dirty="0" smtClean="0"/>
+              <a:t>Distribution of work demands good planning – especially in teams where there’s a gap in skills &amp; experience</a:t>
+            </a:r>
+          </a:p>
+          <a:p>
+            <a:r>
+              <a:rPr lang="en-US" dirty="0" smtClean="0"/>
+              <a:t>As a beginner it’s a blessing to have skilled colleagues around you</a:t>
+            </a:r>
+          </a:p>
+          <a:p>
+            <a:pPr lvl="1"/>
+            <a:r>
+              <a:rPr lang="en-US" dirty="0" smtClean="0"/>
+              <a:t>CSS can be really tricky and might getting out of control without a proper hierarchy</a:t>
+            </a:r>
+          </a:p>
+          <a:p>
+            <a:r>
+              <a:rPr lang="en-US" dirty="0" smtClean="0"/>
+              <a:t>Handling of the repository tool with a suitable hierarchy and the possibility of versioning (unfortunately not available in </a:t>
+            </a:r>
+            <a:r>
+              <a:rPr lang="en-US" dirty="0" err="1" smtClean="0"/>
+              <a:t>GitHub</a:t>
+            </a:r>
+            <a:r>
+              <a:rPr lang="en-US" dirty="0" smtClean="0"/>
+              <a:t>) [WIESO </a:t>
+            </a:r>
+            <a:r>
+              <a:rPr lang="en-US" dirty="0" err="1" smtClean="0"/>
+              <a:t>nid</a:t>
+            </a:r>
+            <a:r>
+              <a:rPr lang="en-US" dirty="0" smtClean="0"/>
+              <a:t>, was </a:t>
+            </a:r>
+            <a:r>
+              <a:rPr lang="en-US" dirty="0" err="1" smtClean="0"/>
+              <a:t>meinsch</a:t>
+            </a:r>
+            <a:r>
+              <a:rPr lang="en-US" dirty="0" smtClean="0"/>
+              <a:t> do?]</a:t>
+            </a:r>
+          </a:p>
+          <a:p>
+            <a:pPr marL="0" indent="0">
+              <a:buNone/>
+            </a:pPr>
+            <a:endParaRPr lang="en-US" dirty="0" smtClean="0"/>
+          </a:p>
+          <a:p>
+            <a:pPr lvl="1"/>
+            <a:endParaRPr lang="en-US" dirty="0"/>
+          </a:p>
+        </p:txBody>
+      </p:sp>
+      <p:sp>
+        <p:nvSpPr>
+          <p:cNvPr id="3" name="Title 2"/>
+          <p:cNvSpPr>
+            <a:spLocks noGrp="1"/>
+          </p:cNvSpPr>
+          <p:nvPr>
+            <p:ph type="ctrTitle"/>
+          </p:nvPr>
+        </p:nvSpPr>
+        <p:spPr/>
+        <p:txBody>
+          <a:bodyPr/>
+          <a:lstStyle/>
+          <a:p>
+            <a:r>
+              <a:rPr lang="en-US" dirty="0" smtClean="0"/>
+              <a:t>Lessons learnt &amp; Review</a:t>
+            </a:r>
+            <a:endParaRPr lang="en-US" dirty="0"/>
+          </a:p>
+        </p:txBody>
+      </p:sp>
+    </p:spTree>
+    <p:extLst>
+      <p:ext uri="{BB962C8B-B14F-4D97-AF65-F5344CB8AC3E}">
+        <p14:creationId xmlns:p14="http://schemas.microsoft.com/office/powerpoint/2010/main" val="2865284130"/>
+      </p:ext>
+    </p:extLst>
+  </p:cSld>
+  <p:clrMapOvr>
+    <a:masterClrMapping/>
+  </p:clrMapOvr>
+  <p:timing>
+    <p:tnLst>
+      <p:par>
+        <p:cTn xmlns:p14="http://schemas.microsoft.com/office/powerpoint/2010/main" id="1" dur="indefinite" restart="never" nodeType="tmRoot"/>
+      </p:par>
+    </p:tnLst>
+  </p:timing>
+</p:sld>
+</file>
+
+<file path=ppt/slides/slide12.xml><?xml version="1.0" encoding="utf-8"?>
+<p:sld xmlns:a="http://schemas.openxmlformats.org/drawingml/2006/main" xmlns:r="http://schemas.openxmlformats.org/officeDocument/2006/relationships" xmlns:p="http://schemas.openxmlformats.org/presentationml/2006/main">
+  <p:cSld>
+    <p:spTree>
+      <p:nvGrpSpPr>
+        <p:cNvPr id="1" name=""/>
+        <p:cNvGrpSpPr/>
+        <p:nvPr/>
+      </p:nvGrpSpPr>
+      <p:grpSpPr>
+        <a:xfrm>
+          <a:off x="0" y="0"/>
+          <a:ext cx="0" cy="0"/>
+          <a:chOff x="0" y="0"/>
+          <a:chExt cx="0" cy="0"/>
+        </a:xfrm>
+      </p:grpSpPr>
+      <p:sp>
+        <p:nvSpPr>
+          <p:cNvPr id="2" name="Content Placeholder 1"/>
+          <p:cNvSpPr>
+            <a:spLocks noGrp="1"/>
+          </p:cNvSpPr>
+          <p:nvPr>
+            <p:ph sz="half" idx="1"/>
+          </p:nvPr>
+        </p:nvSpPr>
+        <p:spPr/>
+        <p:txBody>
+          <a:bodyPr/>
+          <a:lstStyle/>
+          <a:p>
+            <a:r>
+              <a:rPr lang="en-US" dirty="0" smtClean="0"/>
+              <a:t>What we liked </a:t>
+            </a:r>
+          </a:p>
+          <a:p>
+            <a:pPr lvl="1"/>
+            <a:r>
+              <a:rPr lang="en-US" dirty="0" smtClean="0"/>
+              <a:t>Despite of the given technologies to use there was enough space for individual </a:t>
+            </a:r>
+            <a:r>
+              <a:rPr lang="en-US" dirty="0" smtClean="0"/>
+              <a:t>implementation</a:t>
+            </a:r>
+          </a:p>
+          <a:p>
+            <a:pPr lvl="1"/>
+            <a:r>
+              <a:rPr lang="en-US" dirty="0" smtClean="0"/>
+              <a:t>Separation of the workload depending on the skillset</a:t>
+            </a:r>
+            <a:endParaRPr lang="en-US" dirty="0" smtClean="0"/>
+          </a:p>
+          <a:p>
+            <a:endParaRPr lang="en-US" dirty="0"/>
+          </a:p>
+          <a:p>
+            <a:r>
+              <a:rPr lang="en-US" dirty="0" smtClean="0"/>
+              <a:t>What we didn’t like so much…</a:t>
+            </a:r>
+          </a:p>
+          <a:p>
+            <a:pPr lvl="1"/>
+            <a:r>
+              <a:rPr lang="en-US" dirty="0" smtClean="0"/>
+              <a:t>the effort to replace the implementation of a feature with another technology required too much time in some cases</a:t>
+            </a:r>
+          </a:p>
+          <a:p>
+            <a:pPr lvl="1"/>
+            <a:endParaRPr lang="en-US" dirty="0" smtClean="0"/>
+          </a:p>
+          <a:p>
+            <a:pPr lvl="1"/>
+            <a:endParaRPr lang="en-US" dirty="0"/>
+          </a:p>
+        </p:txBody>
+      </p:sp>
+      <p:sp>
+        <p:nvSpPr>
+          <p:cNvPr id="3" name="Title 2"/>
+          <p:cNvSpPr>
+            <a:spLocks noGrp="1"/>
+          </p:cNvSpPr>
+          <p:nvPr>
+            <p:ph type="ctrTitle"/>
+          </p:nvPr>
+        </p:nvSpPr>
+        <p:spPr/>
+        <p:txBody>
+          <a:bodyPr/>
+          <a:lstStyle/>
+          <a:p>
+            <a:r>
+              <a:rPr lang="en-US" dirty="0" smtClean="0"/>
+              <a:t>Lessons learnt &amp; Review</a:t>
+            </a:r>
+            <a:endParaRPr lang="en-US" dirty="0"/>
+          </a:p>
+        </p:txBody>
+      </p:sp>
+    </p:spTree>
+    <p:extLst>
+      <p:ext uri="{BB962C8B-B14F-4D97-AF65-F5344CB8AC3E}">
+        <p14:creationId xmlns:p14="http://schemas.microsoft.com/office/powerpoint/2010/main" val="4053086936"/>
+      </p:ext>
+    </p:extLst>
+  </p:cSld>
+  <p:clrMapOvr>
+    <a:masterClrMapping/>
+  </p:clrMapOvr>
+  <p:timing>
+    <p:tnLst>
+      <p:par>
+        <p:cTn xmlns:p14="http://schemas.microsoft.com/office/powerpoint/2010/main" id="1" dur="indefinite" restart="never" nodeType="tmRoot"/>
+      </p:par>
+    </p:tnLst>
+  </p:timing>
+</p:sld>
+</file>
+
+<file path=ppt/slides/slide13.xml><?xml version="1.0" encoding="utf-8"?>
+<p:sld xmlns:a="http://schemas.openxmlformats.org/drawingml/2006/main" xmlns:r="http://schemas.openxmlformats.org/officeDocument/2006/relationships" xmlns:p="http://schemas.openxmlformats.org/presentationml/2006/main">
+  <p:cSld>
+    <p:spTree>
+      <p:nvGrpSpPr>
+        <p:cNvPr id="1" name=""/>
+        <p:cNvGrpSpPr/>
+        <p:nvPr/>
+      </p:nvGrpSpPr>
+      <p:grpSpPr>
+        <a:xfrm>
+          <a:off x="0" y="0"/>
+          <a:ext cx="0" cy="0"/>
+          <a:chOff x="0" y="0"/>
+          <a:chExt cx="0" cy="0"/>
+        </a:xfrm>
+      </p:grpSpPr>
+      <p:sp>
+        <p:nvSpPr>
           <p:cNvPr id="2" name="Titel 1"/>
           <p:cNvSpPr>
             <a:spLocks noGrp="1"/>
@@ -7264,7 +7653,7 @@
   <p:timing>
     <p:tnLst>
       <p:par>
-        <p:cTn id="1" dur="indefinite" restart="never" nodeType="tmRoot"/>
+        <p:cTn xmlns:p14="http://schemas.microsoft.com/office/powerpoint/2010/main" id="1" dur="indefinite" restart="never" nodeType="tmRoot"/>
       </p:par>
     </p:tnLst>
   </p:timing>
@@ -7531,7 +7920,7 @@
   <p:timing>
     <p:tnLst>
       <p:par>
-        <p:cTn id="1" dur="indefinite" restart="never" nodeType="tmRoot"/>
+        <p:cTn xmlns:p14="http://schemas.microsoft.com/office/powerpoint/2010/main" id="1" dur="indefinite" restart="never" nodeType="tmRoot"/>
       </p:par>
     </p:tnLst>
   </p:timing>
@@ -7572,21 +7961,8 @@
           <a:p>
             <a:r>
               <a:rPr lang="en-US" dirty="0" smtClean="0"/>
-              <a:t>Standard </a:t>
-            </a:r>
-            <a:r>
-              <a:rPr lang="en-US" dirty="0" smtClean="0"/>
-              <a:t>project without </a:t>
-            </a:r>
-            <a:r>
-              <a:rPr lang="en-US" smtClean="0"/>
-              <a:t>the support of </a:t>
-            </a:r>
-            <a:r>
-              <a:rPr lang="en-US" dirty="0" smtClean="0"/>
-              <a:t>a framework: </a:t>
-            </a:r>
-            <a:endParaRPr lang="en-US" dirty="0" smtClean="0"/>
+              <a:t>Standard project without the support of a framework: </a:t>
+            </a:r>
           </a:p>
           <a:p>
             <a:pPr lvl="1"/>
@@ -7629,17 +8005,10 @@
           <a:p>
             <a:pPr lvl="1"/>
             <a:r>
-              <a:rPr lang="en-US" dirty="0" smtClean="0">
-                <a:solidFill>
-                  <a:srgbClr val="FF0000"/>
-                </a:solidFill>
-              </a:rPr>
-              <a:t>Martin:</a:t>
-            </a:r>
-            <a:r>
               <a:rPr lang="en-US" dirty="0" smtClean="0"/>
-              <a:t> ______________________</a:t>
-            </a:r>
+              <a:t>Martin: Backend Web-Developer</a:t>
+            </a:r>
+            <a:endParaRPr lang="en-US" dirty="0" smtClean="0"/>
           </a:p>
           <a:p>
             <a:pPr lvl="1"/>
@@ -7728,7 +8097,7 @@
   <p:timing>
     <p:tnLst>
       <p:par>
-        <p:cTn id="1" dur="indefinite" restart="never" nodeType="tmRoot"/>
+        <p:cTn xmlns:p14="http://schemas.microsoft.com/office/powerpoint/2010/main" id="1" dur="indefinite" restart="never" nodeType="tmRoot"/>
       </p:par>
     </p:tnLst>
   </p:timing>
@@ -7808,40 +8177,68 @@
             <p:ph sz="half" idx="13"/>
           </p:nvPr>
         </p:nvSpPr>
-        <p:spPr/>
+        <p:spPr>
+          <a:xfrm>
+            <a:off x="468000" y="2160000"/>
+            <a:ext cx="8265692" cy="3960000"/>
+          </a:xfrm>
+        </p:spPr>
         <p:txBody>
           <a:bodyPr/>
           <a:lstStyle/>
           <a:p>
             <a:r>
               <a:rPr lang="en-US" dirty="0" smtClean="0"/>
-              <a:t>HTML for static content</a:t>
-            </a:r>
-          </a:p>
-          <a:p>
+              <a:t>HTML </a:t>
+            </a:r>
             <a:r>
               <a:rPr lang="en-US" dirty="0" smtClean="0"/>
-              <a:t>CSS for Styling</a:t>
-            </a:r>
-          </a:p>
-          <a:p>
+              <a:t>for </a:t>
+            </a:r>
             <a:r>
               <a:rPr lang="en-US" dirty="0" smtClean="0"/>
-              <a:t>JavaScript for _____________________</a:t>
-            </a:r>
-          </a:p>
-          <a:p>
+              <a:t>static </a:t>
+            </a:r>
             <a:r>
               <a:rPr lang="en-US" dirty="0" smtClean="0"/>
-              <a:t>PHP </a:t>
+              <a:t>content and templates</a:t>
+            </a:r>
+            <a:endParaRPr lang="en-US" dirty="0" smtClean="0"/>
+          </a:p>
+          <a:p>
+            <a:r>
+              <a:rPr lang="en-US" dirty="0" smtClean="0"/>
+              <a:t>CSS3 </a:t>
+            </a:r>
+            <a:r>
+              <a:rPr lang="en-US" dirty="0" smtClean="0"/>
+              <a:t>for </a:t>
             </a:r>
             <a:r>
               <a:rPr lang="en-US" dirty="0"/>
-              <a:t>for	_____________________</a:t>
-            </a:r>
-          </a:p>
-          <a:p>
+              <a:t>s</a:t>
+            </a:r>
+            <a:r>
+              <a:rPr lang="en-US" dirty="0" smtClean="0"/>
+              <a:t>tyling and animation</a:t>
+            </a:r>
             <a:endParaRPr lang="en-US" dirty="0" smtClean="0"/>
+          </a:p>
+          <a:p>
+            <a:r>
+              <a:rPr lang="en-US" dirty="0" smtClean="0"/>
+              <a:t>JavaScript </a:t>
+            </a:r>
+            <a:r>
+              <a:rPr lang="en-US" dirty="0" smtClean="0"/>
+              <a:t>for the shopping cart cookie</a:t>
+            </a:r>
+          </a:p>
+          <a:p>
+            <a:r>
+              <a:rPr lang="en-US" dirty="0" smtClean="0"/>
+              <a:t>PHP (OOP) for the server</a:t>
+            </a:r>
           </a:p>
           <a:p>
             <a:r>
@@ -7854,8 +8251,9 @@
             </a:r>
             <a:r>
               <a:rPr lang="en-US" dirty="0" smtClean="0"/>
-              <a:t>_____________________</a:t>
-            </a:r>
+              <a:t>fetching Wikipedia data and autocomplete of the search</a:t>
+            </a:r>
+            <a:endParaRPr lang="en-US" dirty="0" smtClean="0"/>
           </a:p>
           <a:p>
             <a:r>
@@ -7864,8 +8262,13 @@
             </a:r>
             <a:r>
               <a:rPr lang="en-US" dirty="0"/>
-              <a:t>for _____________________</a:t>
-            </a:r>
+              <a:t>for </a:t>
+            </a:r>
+            <a:r>
+              <a:rPr lang="en-US" dirty="0" smtClean="0"/>
+              <a:t>fetching Wikipedia articles via REST client</a:t>
+            </a:r>
+            <a:endParaRPr lang="en-US" dirty="0"/>
           </a:p>
           <a:p>
             <a:pPr marL="0" indent="0">
@@ -7879,16 +8282,39 @@
               <a:t>and in addition to them</a:t>
             </a:r>
             <a:r>
+              <a:rPr lang="en-US" dirty="0" smtClean="0"/>
+              <a:t>:</a:t>
+            </a:r>
+          </a:p>
+          <a:p>
+            <a:pPr lvl="1"/>
+            <a:r>
+              <a:rPr lang="en-US" dirty="0" smtClean="0"/>
+              <a:t>MySQL </a:t>
+            </a:r>
+            <a:r>
               <a:rPr lang="en-US" dirty="0"/>
-              <a:t>: _____________________</a:t>
-            </a:r>
-          </a:p>
-          <a:p>
+              <a:t>for storing the </a:t>
+            </a:r>
+            <a:r>
+              <a:rPr lang="en-US" dirty="0" smtClean="0"/>
+              <a:t>data</a:t>
+            </a:r>
+          </a:p>
+          <a:p>
+            <a:pPr lvl="1"/>
+            <a:r>
+              <a:rPr lang="en-US" dirty="0" smtClean="0"/>
+              <a:t>Regex for form validation / template rendering and translation files</a:t>
+            </a:r>
+          </a:p>
+          <a:p>
+            <a:pPr lvl="1"/>
+            <a:r>
+              <a:rPr lang="en-US" dirty="0" err="1" smtClean="0"/>
+              <a:t>jQuery</a:t>
+            </a:r>
             <a:endParaRPr lang="en-US" dirty="0" smtClean="0"/>
-          </a:p>
-          <a:p>
-            <a:pPr lvl="1"/>
-            <a:endParaRPr lang="en-US" dirty="0"/>
           </a:p>
         </p:txBody>
       </p:sp>
@@ -7905,7 +8331,7 @@
   <p:timing>
     <p:tnLst>
       <p:par>
-        <p:cTn id="1" dur="indefinite" restart="never" nodeType="tmRoot"/>
+        <p:cTn xmlns:p14="http://schemas.microsoft.com/office/powerpoint/2010/main" id="1" dur="indefinite" restart="never" nodeType="tmRoot"/>
       </p:par>
     </p:tnLst>
   </p:timing>
@@ -7946,7 +8372,11 @@
           <a:p>
             <a:r>
               <a:rPr lang="de-CH" dirty="0" smtClean="0"/>
-              <a:t>Live Demonstration &amp; Features</a:t>
+              <a:t>Live Demonstration &amp; </a:t>
+            </a:r>
+            <a:r>
+              <a:rPr lang="de-CH" dirty="0" smtClean="0"/>
+              <a:t>Features - Core</a:t>
             </a:r>
             <a:endParaRPr lang="de-CH" dirty="0"/>
           </a:p>
@@ -8002,8 +8432,8 @@
         </p:nvSpPr>
         <p:spPr>
           <a:xfrm>
-            <a:off x="467999" y="1439230"/>
-            <a:ext cx="8171999" cy="3960000"/>
+            <a:off x="468000" y="1439230"/>
+            <a:ext cx="3850000" cy="3960000"/>
           </a:xfrm>
         </p:spPr>
         <p:txBody>
@@ -8011,47 +8441,174 @@
           <a:lstStyle/>
           <a:p>
             <a:r>
-              <a:rPr lang="de-CH" i="1" dirty="0" smtClean="0"/>
-              <a:t>Martin (</a:t>
-            </a:r>
-            <a:r>
-              <a:rPr lang="de-CH" i="1" dirty="0"/>
-              <a:t>Namen entfernen wir dann für </a:t>
-            </a:r>
-            <a:r>
-              <a:rPr lang="de-CH" i="1" dirty="0" err="1"/>
-              <a:t>Präsi</a:t>
-            </a:r>
-            <a:r>
-              <a:rPr lang="de-CH" i="1" dirty="0" smtClean="0"/>
-              <a:t>):</a:t>
+              <a:rPr lang="de-CH" dirty="0" smtClean="0"/>
+              <a:t>Template Engine</a:t>
+            </a:r>
+          </a:p>
+          <a:p>
+            <a:pPr lvl="1"/>
+            <a:r>
+              <a:rPr lang="de-CH" dirty="0" smtClean="0"/>
+              <a:t>Variables </a:t>
+            </a:r>
+            <a:r>
+              <a:rPr lang="de-CH" dirty="0"/>
+              <a:t>/ </a:t>
+            </a:r>
+            <a:r>
+              <a:rPr lang="de-CH" dirty="0" err="1" smtClean="0"/>
+              <a:t>Ifs</a:t>
+            </a:r>
+            <a:r>
+              <a:rPr lang="de-CH" dirty="0" smtClean="0"/>
+              <a:t> </a:t>
+            </a:r>
+            <a:r>
+              <a:rPr lang="de-CH" dirty="0"/>
+              <a:t>/ </a:t>
+            </a:r>
+            <a:r>
+              <a:rPr lang="de-CH" dirty="0" smtClean="0"/>
+              <a:t>Loops</a:t>
+            </a:r>
+            <a:endParaRPr lang="de-CH" dirty="0"/>
+          </a:p>
+          <a:p>
+            <a:r>
+              <a:rPr lang="de-CH" dirty="0"/>
+              <a:t>Translation</a:t>
+            </a:r>
+          </a:p>
+          <a:p>
+            <a:pPr lvl="1"/>
+            <a:r>
+              <a:rPr lang="de-CH" dirty="0" err="1" smtClean="0"/>
+              <a:t>Based</a:t>
+            </a:r>
+            <a:r>
+              <a:rPr lang="de-CH" dirty="0" smtClean="0"/>
+              <a:t> on </a:t>
+            </a:r>
+            <a:r>
+              <a:rPr lang="de-CH" dirty="0" err="1" smtClean="0"/>
+              <a:t>files</a:t>
+            </a:r>
+            <a:endParaRPr lang="de-CH" dirty="0"/>
+          </a:p>
+          <a:p>
+            <a:pPr lvl="1"/>
+            <a:r>
+              <a:rPr lang="de-CH" dirty="0" smtClean="0"/>
+              <a:t>Variables </a:t>
+            </a:r>
+            <a:r>
+              <a:rPr lang="de-CH" dirty="0" err="1" smtClean="0"/>
+              <a:t>possible</a:t>
             </a:r>
             <a:endParaRPr lang="de-CH" dirty="0" smtClean="0"/>
           </a:p>
           <a:p>
+            <a:r>
+              <a:rPr lang="de-CH" dirty="0" smtClean="0"/>
+              <a:t>DB-Models </a:t>
+            </a:r>
+          </a:p>
+          <a:p>
             <a:pPr lvl="1"/>
             <a:r>
               <a:rPr lang="de-CH" dirty="0" smtClean="0"/>
-              <a:t>Basis Infrastruktur</a:t>
+              <a:t>Dynamic</a:t>
             </a:r>
           </a:p>
           <a:p>
             <a:pPr lvl="1"/>
             <a:r>
               <a:rPr lang="de-CH" dirty="0" smtClean="0"/>
-              <a:t>DEINE THEMEN</a:t>
+              <a:t>Simple </a:t>
+            </a:r>
+            <a:r>
+              <a:rPr lang="de-CH" dirty="0" err="1" smtClean="0"/>
+              <a:t>to</a:t>
+            </a:r>
+            <a:r>
+              <a:rPr lang="de-CH" dirty="0" smtClean="0"/>
+              <a:t> </a:t>
+            </a:r>
+            <a:r>
+              <a:rPr lang="de-CH" dirty="0" err="1" smtClean="0"/>
+              <a:t>extend</a:t>
+            </a:r>
+            <a:endParaRPr lang="de-CH" dirty="0" smtClean="0"/>
+          </a:p>
+          <a:p>
+            <a:r>
+              <a:rPr lang="de-CH" dirty="0" smtClean="0"/>
+              <a:t>View Controller</a:t>
             </a:r>
           </a:p>
           <a:p>
             <a:pPr lvl="1"/>
             <a:r>
               <a:rPr lang="de-CH" dirty="0" smtClean="0"/>
-              <a:t>+ Präsentation eines Features nach Wahl</a:t>
-            </a:r>
-            <a:endParaRPr lang="de-CH" dirty="0"/>
-          </a:p>
-        </p:txBody>
-      </p:sp>
+              <a:t>Fast </a:t>
+            </a:r>
+            <a:r>
+              <a:rPr lang="de-CH" dirty="0" err="1" smtClean="0"/>
+              <a:t>development</a:t>
+            </a:r>
+            <a:endParaRPr lang="de-CH" dirty="0" smtClean="0"/>
+          </a:p>
+          <a:p>
+            <a:pPr lvl="1"/>
+            <a:r>
+              <a:rPr lang="de-CH" dirty="0" smtClean="0"/>
+              <a:t>AJAX-</a:t>
+            </a:r>
+            <a:r>
+              <a:rPr lang="de-CH" dirty="0" err="1" smtClean="0"/>
+              <a:t>calls</a:t>
+            </a:r>
+            <a:endParaRPr lang="de-CH" dirty="0" smtClean="0"/>
+          </a:p>
+          <a:p>
+            <a:pPr lvl="1"/>
+            <a:endParaRPr lang="de-CH" dirty="0" smtClean="0"/>
+          </a:p>
+          <a:p>
+            <a:pPr lvl="2"/>
+            <a:endParaRPr lang="de-CH" dirty="0" smtClean="0"/>
+          </a:p>
+        </p:txBody>
+      </p:sp>
+      <p:pic>
+        <p:nvPicPr>
+          <p:cNvPr id="2" name="Bild 1" descr="model presentation.png"/>
+          <p:cNvPicPr>
+            <a:picLocks noChangeAspect="1"/>
+          </p:cNvPicPr>
+          <p:nvPr/>
+        </p:nvPicPr>
+        <p:blipFill rotWithShape="1">
+          <a:blip r:embed="rId2">
+            <a:extLst>
+              <a:ext uri="{28A0092B-C50C-407E-A947-70E740481C1C}">
+                <a14:useLocalDpi xmlns:a14="http://schemas.microsoft.com/office/drawing/2010/main" val="0"/>
+              </a:ext>
+            </a:extLst>
+          </a:blip>
+          <a:srcRect r="19456" b="49669"/>
+          <a:stretch/>
+        </p:blipFill>
+        <p:spPr>
+          <a:xfrm>
+            <a:off x="3985849" y="1248764"/>
+            <a:ext cx="4642067" cy="4256634"/>
+          </a:xfrm>
+          <a:prstGeom prst="rect">
+            <a:avLst/>
+          </a:prstGeom>
+        </p:spPr>
+      </p:pic>
     </p:spTree>
     <p:extLst>
       <p:ext uri="{BB962C8B-B14F-4D97-AF65-F5344CB8AC3E}">
@@ -8065,7 +8622,7 @@
   <p:timing>
     <p:tnLst>
       <p:par>
-        <p:cTn id="1" dur="indefinite" restart="never" nodeType="tmRoot"/>
+        <p:cTn xmlns:p14="http://schemas.microsoft.com/office/powerpoint/2010/main" id="1" dur="indefinite" restart="never" nodeType="tmRoot"/>
       </p:par>
     </p:tnLst>
   </p:timing>
@@ -8106,7 +8663,11 @@
           <a:p>
             <a:r>
               <a:rPr lang="de-CH" dirty="0" smtClean="0"/>
-              <a:t>Live Demonstration &amp; Features</a:t>
+              <a:t>Live Demonstration &amp; </a:t>
+            </a:r>
+            <a:r>
+              <a:rPr lang="de-CH" dirty="0" smtClean="0"/>
+              <a:t>Features - Translation</a:t>
             </a:r>
             <a:endParaRPr lang="de-CH" dirty="0"/>
           </a:p>
@@ -8150,106 +8711,38 @@
           </a:p>
         </p:txBody>
       </p:sp>
-      <p:sp>
-        <p:nvSpPr>
-          <p:cNvPr id="9" name="Inhaltsplatzhalter 8"/>
-          <p:cNvSpPr>
-            <a:spLocks noGrp="1"/>
-          </p:cNvSpPr>
+      <p:pic>
+        <p:nvPicPr>
+          <p:cNvPr id="3" name="Inhaltsplatzhalter 2" descr="model presentation-translation.png"/>
+          <p:cNvPicPr>
+            <a:picLocks noGrp="1" noChangeAspect="1"/>
+          </p:cNvPicPr>
           <p:nvPr>
             <p:ph sz="half" idx="13"/>
           </p:nvPr>
-        </p:nvSpPr>
+        </p:nvPicPr>
+        <p:blipFill rotWithShape="1">
+          <a:blip r:embed="rId2">
+            <a:extLst>
+              <a:ext uri="{28A0092B-C50C-407E-A947-70E740481C1C}">
+                <a14:useLocalDpi xmlns:a14="http://schemas.microsoft.com/office/drawing/2010/main" val="0"/>
+              </a:ext>
+            </a:extLst>
+          </a:blip>
+          <a:srcRect t="6560" r="1837" b="59804"/>
+          <a:stretch/>
+        </p:blipFill>
         <p:spPr>
           <a:xfrm>
-            <a:off x="468000" y="1439230"/>
-            <a:ext cx="8171998" cy="3960000"/>
+            <a:off x="617726" y="1124693"/>
+            <a:ext cx="8022273" cy="3888155"/>
           </a:xfrm>
         </p:spPr>
-        <p:txBody>
-          <a:bodyPr/>
-          <a:lstStyle/>
-          <a:p>
-            <a:r>
-              <a:rPr lang="de-CH" i="1" dirty="0" smtClean="0"/>
-              <a:t>Marcel (Namen entfernen wir dann für </a:t>
-            </a:r>
-            <a:r>
-              <a:rPr lang="de-CH" i="1" dirty="0" err="1" smtClean="0"/>
-              <a:t>Präsi</a:t>
-            </a:r>
-            <a:r>
-              <a:rPr lang="de-CH" i="1" dirty="0" smtClean="0"/>
-              <a:t>):</a:t>
-            </a:r>
-            <a:endParaRPr lang="de-CH" i="1" dirty="0"/>
-          </a:p>
-          <a:p>
-            <a:pPr lvl="1"/>
-            <a:r>
-              <a:rPr lang="de-CH" dirty="0" smtClean="0"/>
-              <a:t>DEINE THEMEN</a:t>
-            </a:r>
-          </a:p>
-          <a:p>
-            <a:pPr lvl="1"/>
-            <a:r>
-              <a:rPr lang="de-CH" dirty="0" smtClean="0"/>
-              <a:t>Wikipedia-REST </a:t>
-            </a:r>
-            <a:r>
-              <a:rPr lang="de-CH" dirty="0"/>
-              <a:t>API- Präsentation Shop- </a:t>
-            </a:r>
-            <a:r>
-              <a:rPr lang="de-CH" dirty="0" smtClean="0"/>
-              <a:t>Model</a:t>
-            </a:r>
-            <a:br>
-              <a:rPr lang="de-CH" dirty="0" smtClean="0"/>
-            </a:br>
-            <a:r>
-              <a:rPr lang="de-CH" dirty="0" smtClean="0"/>
-              <a:t>Beispiel </a:t>
-            </a:r>
-            <a:r>
-              <a:rPr lang="de-CH" dirty="0"/>
-              <a:t>anhand </a:t>
-            </a:r>
-            <a:r>
-              <a:rPr lang="de-CH" dirty="0" smtClean="0"/>
-              <a:t>User Model </a:t>
-            </a:r>
-            <a:r>
-              <a:rPr lang="de-CH" dirty="0"/>
-              <a:t>(</a:t>
-            </a:r>
-            <a:r>
-              <a:rPr lang="de-CH" dirty="0" err="1"/>
-              <a:t>create</a:t>
-            </a:r>
-            <a:r>
-              <a:rPr lang="de-CH" dirty="0"/>
-              <a:t> / </a:t>
-            </a:r>
-            <a:r>
-              <a:rPr lang="de-CH" dirty="0" err="1"/>
-              <a:t>login</a:t>
-            </a:r>
-            <a:r>
-              <a:rPr lang="de-CH" dirty="0"/>
-              <a:t>)</a:t>
-            </a:r>
-          </a:p>
-          <a:p>
-            <a:endParaRPr lang="de-CH" dirty="0"/>
-          </a:p>
-        </p:txBody>
-      </p:sp>
+      </p:pic>
     </p:spTree>
     <p:extLst>
       <p:ext uri="{BB962C8B-B14F-4D97-AF65-F5344CB8AC3E}">
-        <p14:creationId xmlns:p14="http://schemas.microsoft.com/office/powerpoint/2010/main" val="1221095212"/>
+        <p14:creationId xmlns:p14="http://schemas.microsoft.com/office/powerpoint/2010/main" val="4128981613"/>
       </p:ext>
     </p:extLst>
   </p:cSld>
@@ -8259,7 +8752,7 @@
   <p:timing>
     <p:tnLst>
       <p:par>
-        <p:cTn id="1" dur="indefinite" restart="never" nodeType="tmRoot"/>
+        <p:cTn xmlns:p14="http://schemas.microsoft.com/office/powerpoint/2010/main" id="1" dur="indefinite" restart="never" nodeType="tmRoot"/>
       </p:par>
     </p:tnLst>
   </p:timing>
@@ -8300,7 +8793,11 @@
           <a:p>
             <a:r>
               <a:rPr lang="de-CH" dirty="0" smtClean="0"/>
-              <a:t>Live Demonstration &amp; Features</a:t>
+              <a:t>Live Demonstration &amp; </a:t>
+            </a:r>
+            <a:r>
+              <a:rPr lang="de-CH" dirty="0" smtClean="0"/>
+              <a:t>Features - Template Engine</a:t>
             </a:r>
             <a:endParaRPr lang="de-CH" dirty="0"/>
           </a:p>
@@ -8344,325 +8841,39 @@
           </a:p>
         </p:txBody>
       </p:sp>
-      <p:sp>
-        <p:nvSpPr>
-          <p:cNvPr id="9" name="Inhaltsplatzhalter 8"/>
-          <p:cNvSpPr>
-            <a:spLocks noGrp="1"/>
-          </p:cNvSpPr>
-          <p:nvPr>
-            <p:ph sz="half" idx="13"/>
-          </p:nvPr>
-        </p:nvSpPr>
+      <p:pic>
+        <p:nvPicPr>
+          <p:cNvPr id="5" name="Bild 4" descr="model presentation-renderer.png"/>
+          <p:cNvPicPr>
+            <a:picLocks noChangeAspect="1"/>
+          </p:cNvPicPr>
+          <p:nvPr/>
+        </p:nvPicPr>
+        <p:blipFill rotWithShape="1">
+          <a:blip r:embed="rId2">
+            <a:extLst>
+              <a:ext uri="{28A0092B-C50C-407E-A947-70E740481C1C}">
+                <a14:useLocalDpi xmlns:a14="http://schemas.microsoft.com/office/drawing/2010/main" val="0"/>
+              </a:ext>
+            </a:extLst>
+          </a:blip>
+          <a:srcRect t="11966" r="3255" b="51852"/>
+          <a:stretch/>
+        </p:blipFill>
         <p:spPr>
           <a:xfrm>
-            <a:off x="468000" y="1439230"/>
-            <a:ext cx="8171998" cy="3960000"/>
+            <a:off x="1208762" y="1465385"/>
+            <a:ext cx="6980637" cy="3692764"/>
           </a:xfrm>
+          <a:prstGeom prst="rect">
+            <a:avLst/>
+          </a:prstGeom>
         </p:spPr>
-        <p:txBody>
-          <a:bodyPr/>
-          <a:lstStyle/>
-          <a:p>
-            <a:r>
-              <a:rPr lang="de-CH" i="1" dirty="0" smtClean="0"/>
-              <a:t>Fabian </a:t>
-            </a:r>
-            <a:r>
-              <a:rPr lang="de-CH" i="1" dirty="0"/>
-              <a:t>(Namen entfernen wir dann für </a:t>
-            </a:r>
-            <a:r>
-              <a:rPr lang="de-CH" i="1" dirty="0" err="1"/>
-              <a:t>Präsi</a:t>
-            </a:r>
-            <a:r>
-              <a:rPr lang="de-CH" i="1" dirty="0" smtClean="0"/>
-              <a:t>):</a:t>
-            </a:r>
-            <a:r>
-              <a:rPr lang="de-CH" dirty="0" smtClean="0"/>
-              <a:t>:</a:t>
-            </a:r>
-            <a:endParaRPr lang="de-CH" dirty="0"/>
-          </a:p>
-          <a:p>
-            <a:pPr lvl="1"/>
-            <a:r>
-              <a:rPr lang="de-CH" dirty="0" smtClean="0"/>
-              <a:t>Shopping </a:t>
-            </a:r>
-            <a:r>
-              <a:rPr lang="de-CH" dirty="0" err="1" smtClean="0"/>
-              <a:t>with</a:t>
-            </a:r>
-            <a:r>
-              <a:rPr lang="de-CH" dirty="0" smtClean="0"/>
-              <a:t> «</a:t>
-            </a:r>
-            <a:r>
-              <a:rPr lang="de-CH" dirty="0" err="1" smtClean="0"/>
-              <a:t>groot</a:t>
-            </a:r>
-            <a:r>
-              <a:rPr lang="de-CH" dirty="0" smtClean="0"/>
-              <a:t>»</a:t>
-            </a:r>
-          </a:p>
-          <a:p>
-            <a:pPr lvl="1"/>
-            <a:r>
-              <a:rPr lang="de-CH" dirty="0" smtClean="0"/>
-              <a:t>Shopping </a:t>
-            </a:r>
-            <a:r>
-              <a:rPr lang="de-CH" dirty="0" err="1" smtClean="0"/>
-              <a:t>cart</a:t>
-            </a:r>
-            <a:endParaRPr lang="de-CH" dirty="0" smtClean="0"/>
-          </a:p>
-          <a:p>
-            <a:pPr lvl="2"/>
-            <a:r>
-              <a:rPr lang="de-CH" dirty="0" smtClean="0"/>
-              <a:t>OOP </a:t>
-            </a:r>
-            <a:r>
-              <a:rPr lang="de-CH" dirty="0" err="1"/>
-              <a:t>e</a:t>
-            </a:r>
-            <a:r>
-              <a:rPr lang="de-CH" dirty="0" err="1" smtClean="0"/>
-              <a:t>lement</a:t>
-            </a:r>
-            <a:r>
-              <a:rPr lang="de-CH" dirty="0" smtClean="0"/>
-              <a:t> in PHP</a:t>
-            </a:r>
-          </a:p>
-          <a:p>
-            <a:pPr lvl="2"/>
-            <a:r>
-              <a:rPr lang="de-CH" dirty="0" err="1" smtClean="0"/>
-              <a:t>Cart</a:t>
-            </a:r>
-            <a:r>
-              <a:rPr lang="de-CH" dirty="0" smtClean="0"/>
-              <a:t> </a:t>
-            </a:r>
-            <a:r>
-              <a:rPr lang="de-CH" dirty="0" err="1" smtClean="0"/>
-              <a:t>temporarily</a:t>
-            </a:r>
-            <a:r>
-              <a:rPr lang="de-CH" dirty="0" smtClean="0"/>
-              <a:t> </a:t>
-            </a:r>
-            <a:r>
-              <a:rPr lang="de-CH" dirty="0" err="1" smtClean="0"/>
-              <a:t>stored</a:t>
-            </a:r>
-            <a:r>
-              <a:rPr lang="de-CH" dirty="0" smtClean="0"/>
-              <a:t> </a:t>
-            </a:r>
-            <a:r>
-              <a:rPr lang="de-CH" dirty="0" err="1" smtClean="0"/>
-              <a:t>as</a:t>
-            </a:r>
-            <a:r>
-              <a:rPr lang="de-CH" dirty="0" smtClean="0"/>
-              <a:t> a JSON </a:t>
-            </a:r>
-            <a:r>
-              <a:rPr lang="de-CH" dirty="0" err="1" smtClean="0"/>
-              <a:t>encoded</a:t>
-            </a:r>
-            <a:r>
-              <a:rPr lang="de-CH" dirty="0" smtClean="0"/>
-              <a:t> </a:t>
-            </a:r>
-            <a:r>
-              <a:rPr lang="de-CH" dirty="0" err="1" smtClean="0"/>
-              <a:t>array</a:t>
-            </a:r>
-            <a:r>
-              <a:rPr lang="de-CH" dirty="0" smtClean="0"/>
-              <a:t> in </a:t>
-            </a:r>
-            <a:r>
-              <a:rPr lang="de-CH" smtClean="0"/>
-              <a:t>a Cookie</a:t>
-            </a:r>
-          </a:p>
-          <a:p>
-            <a:pPr lvl="2"/>
-            <a:r>
-              <a:rPr lang="de-CH" smtClean="0"/>
-              <a:t>Creating</a:t>
-            </a:r>
-            <a:r>
-              <a:rPr lang="de-CH" dirty="0" smtClean="0"/>
-              <a:t> </a:t>
-            </a:r>
-            <a:r>
-              <a:rPr lang="de-CH" dirty="0" err="1" smtClean="0"/>
-              <a:t>of</a:t>
-            </a:r>
-            <a:r>
-              <a:rPr lang="de-CH" dirty="0" smtClean="0"/>
-              <a:t> a </a:t>
-            </a:r>
-            <a:r>
-              <a:rPr lang="de-CH" dirty="0" err="1" smtClean="0"/>
-              <a:t>shopping</a:t>
-            </a:r>
-            <a:r>
-              <a:rPr lang="de-CH" dirty="0" smtClean="0"/>
-              <a:t> </a:t>
-            </a:r>
-            <a:r>
-              <a:rPr lang="de-CH" dirty="0" err="1" smtClean="0"/>
-              <a:t>cart</a:t>
-            </a:r>
-            <a:r>
-              <a:rPr lang="de-CH" dirty="0" smtClean="0"/>
-              <a:t> </a:t>
-            </a:r>
-            <a:r>
-              <a:rPr lang="de-CH" dirty="0" err="1" smtClean="0"/>
-              <a:t>object</a:t>
-            </a:r>
-            <a:r>
-              <a:rPr lang="de-CH" dirty="0" smtClean="0"/>
-              <a:t> </a:t>
-            </a:r>
-            <a:r>
-              <a:rPr lang="de-CH" dirty="0" err="1" smtClean="0"/>
-              <a:t>by</a:t>
-            </a:r>
-            <a:r>
-              <a:rPr lang="de-CH" dirty="0" smtClean="0"/>
-              <a:t> </a:t>
-            </a:r>
-            <a:r>
-              <a:rPr lang="de-CH" dirty="0" err="1" smtClean="0"/>
-              <a:t>using</a:t>
-            </a:r>
-            <a:r>
-              <a:rPr lang="de-CH" dirty="0" smtClean="0"/>
-              <a:t> </a:t>
-            </a:r>
-            <a:r>
-              <a:rPr lang="de-CH" dirty="0" err="1" smtClean="0"/>
-              <a:t>the</a:t>
-            </a:r>
-            <a:r>
-              <a:rPr lang="de-CH" dirty="0" smtClean="0"/>
-              <a:t> </a:t>
-            </a:r>
-            <a:r>
-              <a:rPr lang="de-CH" dirty="0" err="1" smtClean="0"/>
-              <a:t>array</a:t>
-            </a:r>
-            <a:r>
-              <a:rPr lang="de-CH" dirty="0" smtClean="0"/>
-              <a:t> in </a:t>
-            </a:r>
-            <a:r>
-              <a:rPr lang="de-CH" dirty="0" err="1" smtClean="0"/>
-              <a:t>order</a:t>
-            </a:r>
-            <a:r>
-              <a:rPr lang="de-CH" dirty="0" smtClean="0"/>
-              <a:t> to have </a:t>
-            </a:r>
-            <a:r>
-              <a:rPr lang="de-CH" dirty="0" err="1" smtClean="0"/>
-              <a:t>access</a:t>
-            </a:r>
-            <a:r>
-              <a:rPr lang="de-CH" dirty="0" smtClean="0"/>
-              <a:t> to </a:t>
-            </a:r>
-            <a:r>
-              <a:rPr lang="de-CH" dirty="0" err="1" smtClean="0"/>
-              <a:t>functions</a:t>
-            </a:r>
-            <a:r>
-              <a:rPr lang="de-CH" dirty="0" smtClean="0"/>
-              <a:t> like </a:t>
-            </a:r>
-            <a:r>
-              <a:rPr lang="de-CH" dirty="0" err="1" smtClean="0"/>
-              <a:t>calculate</a:t>
-            </a:r>
-            <a:r>
-              <a:rPr lang="de-CH" dirty="0" smtClean="0"/>
-              <a:t> </a:t>
-            </a:r>
-            <a:r>
-              <a:rPr lang="de-CH" dirty="0" err="1" smtClean="0"/>
-              <a:t>price</a:t>
-            </a:r>
-            <a:r>
-              <a:rPr lang="de-CH" dirty="0" smtClean="0"/>
-              <a:t> &amp; </a:t>
-            </a:r>
-            <a:r>
-              <a:rPr lang="de-CH" dirty="0" err="1" smtClean="0"/>
-              <a:t>display</a:t>
-            </a:r>
-            <a:r>
-              <a:rPr lang="de-CH" dirty="0" smtClean="0"/>
-              <a:t> </a:t>
-            </a:r>
-            <a:r>
-              <a:rPr lang="de-CH" dirty="0" err="1" smtClean="0"/>
-              <a:t>the</a:t>
-            </a:r>
-            <a:r>
-              <a:rPr lang="de-CH" dirty="0" smtClean="0"/>
-              <a:t> </a:t>
-            </a:r>
-            <a:r>
-              <a:rPr lang="de-CH" dirty="0" err="1" smtClean="0"/>
-              <a:t>cart</a:t>
-            </a:r>
-            <a:r>
-              <a:rPr lang="de-CH" dirty="0" smtClean="0"/>
-              <a:t> </a:t>
-            </a:r>
-          </a:p>
-          <a:p>
-            <a:pPr lvl="2"/>
-            <a:r>
-              <a:rPr lang="de-CH" dirty="0" err="1" smtClean="0"/>
-              <a:t>Ordering</a:t>
-            </a:r>
-            <a:r>
-              <a:rPr lang="de-CH" dirty="0" smtClean="0"/>
-              <a:t> </a:t>
-            </a:r>
-            <a:r>
-              <a:rPr lang="de-CH" dirty="0" err="1" smtClean="0"/>
-              <a:t>process</a:t>
-            </a:r>
-            <a:endParaRPr lang="de-CH" dirty="0" smtClean="0"/>
-          </a:p>
-          <a:p>
-            <a:pPr lvl="1"/>
-            <a:r>
-              <a:rPr lang="de-CH" dirty="0" smtClean="0"/>
-              <a:t>Layout</a:t>
-            </a:r>
-          </a:p>
-        </p:txBody>
-      </p:sp>
+      </p:pic>
     </p:spTree>
     <p:extLst>
       <p:ext uri="{BB962C8B-B14F-4D97-AF65-F5344CB8AC3E}">
-        <p14:creationId xmlns:p14="http://schemas.microsoft.com/office/powerpoint/2010/main" val="291798853"/>
+        <p14:creationId xmlns:p14="http://schemas.microsoft.com/office/powerpoint/2010/main" val="1275846205"/>
       </p:ext>
     </p:extLst>
   </p:cSld>
@@ -8672,7 +8883,7 @@
   <p:timing>
     <p:tnLst>
       <p:par>
-        <p:cTn id="1" dur="indefinite" restart="never" nodeType="tmRoot"/>
+        <p:cTn xmlns:p14="http://schemas.microsoft.com/office/powerpoint/2010/main" id="1" dur="indefinite" restart="never" nodeType="tmRoot"/>
       </p:par>
     </p:tnLst>
   </p:timing>
@@ -8698,91 +8909,7 @@
       </p:grpSpPr>
       <p:sp>
         <p:nvSpPr>
-          <p:cNvPr id="2" name="Inhaltsplatzhalter 1"/>
-          <p:cNvSpPr>
-            <a:spLocks noGrp="1"/>
-          </p:cNvSpPr>
-          <p:nvPr>
-            <p:ph sz="half" idx="1"/>
-          </p:nvPr>
-        </p:nvSpPr>
-        <p:spPr/>
-        <p:txBody>
-          <a:bodyPr/>
-          <a:lstStyle/>
-          <a:p>
-            <a:r>
-              <a:rPr lang="de-CH" dirty="0" smtClean="0"/>
-              <a:t>Martin</a:t>
-            </a:r>
-          </a:p>
-          <a:p>
-            <a:pPr lvl="1"/>
-            <a:r>
-              <a:rPr lang="de-CH" dirty="0" smtClean="0"/>
-              <a:t>_________</a:t>
-            </a:r>
-          </a:p>
-          <a:p>
-            <a:r>
-              <a:rPr lang="de-CH" dirty="0" smtClean="0"/>
-              <a:t>Fabian</a:t>
-            </a:r>
-          </a:p>
-          <a:p>
-            <a:pPr lvl="1"/>
-            <a:r>
-              <a:rPr lang="de-CH" dirty="0" smtClean="0"/>
-              <a:t>Shopping </a:t>
-            </a:r>
-            <a:r>
-              <a:rPr lang="de-CH" dirty="0" err="1" smtClean="0"/>
-              <a:t>cart</a:t>
-            </a:r>
-            <a:r>
-              <a:rPr lang="de-CH" dirty="0" smtClean="0"/>
-              <a:t> &amp; </a:t>
-            </a:r>
-            <a:r>
-              <a:rPr lang="de-CH" dirty="0" err="1" smtClean="0"/>
-              <a:t>ordering</a:t>
-            </a:r>
-            <a:endParaRPr lang="de-CH" dirty="0" smtClean="0"/>
-          </a:p>
-          <a:p>
-            <a:pPr lvl="1"/>
-            <a:r>
-              <a:rPr lang="de-CH" dirty="0" smtClean="0"/>
-              <a:t>CSS</a:t>
-            </a:r>
-          </a:p>
-          <a:p>
-            <a:r>
-              <a:rPr lang="de-CH" dirty="0" smtClean="0"/>
-              <a:t>Marcel</a:t>
-            </a:r>
-          </a:p>
-          <a:p>
-            <a:pPr lvl="1"/>
-            <a:r>
-              <a:rPr lang="de-CH" dirty="0"/>
-              <a:t>_________</a:t>
-            </a:r>
-          </a:p>
-          <a:p>
-            <a:endParaRPr lang="de-CH" dirty="0" smtClean="0"/>
-          </a:p>
-          <a:p>
-            <a:endParaRPr lang="de-CH" dirty="0" smtClean="0"/>
-          </a:p>
-          <a:p>
-            <a:endParaRPr lang="de-CH" dirty="0"/>
-          </a:p>
-        </p:txBody>
-      </p:sp>
-      <p:sp>
-        <p:nvSpPr>
-          <p:cNvPr id="3" name="Titel 2"/>
+          <p:cNvPr id="7" name="Titel 6"/>
           <p:cNvSpPr>
             <a:spLocks noGrp="1"/>
           </p:cNvSpPr>
@@ -8796,29 +8923,143 @@
           <a:lstStyle/>
           <a:p>
             <a:r>
+              <a:rPr lang="de-CH" dirty="0" smtClean="0"/>
+              <a:t>Live Demonstration &amp; Features</a:t>
+            </a:r>
+            <a:endParaRPr lang="de-CH" dirty="0"/>
+          </a:p>
+        </p:txBody>
+      </p:sp>
+      <p:sp>
+        <p:nvSpPr>
+          <p:cNvPr id="8" name="Textplatzhalter 7"/>
+          <p:cNvSpPr>
+            <a:spLocks noGrp="1"/>
+          </p:cNvSpPr>
+          <p:nvPr>
+            <p:ph type="body" idx="1"/>
+          </p:nvPr>
+        </p:nvSpPr>
+        <p:spPr/>
+        <p:txBody>
+          <a:bodyPr/>
+          <a:lstStyle/>
+          <a:p>
+            <a:endParaRPr lang="de-CH" dirty="0"/>
+          </a:p>
+        </p:txBody>
+      </p:sp>
+      <p:sp>
+        <p:nvSpPr>
+          <p:cNvPr id="11" name="Textplatzhalter 10"/>
+          <p:cNvSpPr>
+            <a:spLocks noGrp="1"/>
+          </p:cNvSpPr>
+          <p:nvPr>
+            <p:ph type="body" idx="18"/>
+          </p:nvPr>
+        </p:nvSpPr>
+        <p:spPr/>
+        <p:txBody>
+          <a:bodyPr/>
+          <a:lstStyle/>
+          <a:p>
+            <a:endParaRPr lang="de-CH"/>
+          </a:p>
+        </p:txBody>
+      </p:sp>
+      <p:sp>
+        <p:nvSpPr>
+          <p:cNvPr id="9" name="Inhaltsplatzhalter 8"/>
+          <p:cNvSpPr>
+            <a:spLocks noGrp="1"/>
+          </p:cNvSpPr>
+          <p:nvPr>
+            <p:ph sz="half" idx="13"/>
+          </p:nvPr>
+        </p:nvSpPr>
+        <p:spPr>
+          <a:xfrm>
+            <a:off x="468000" y="1439230"/>
+            <a:ext cx="8171998" cy="3960000"/>
+          </a:xfrm>
+        </p:spPr>
+        <p:txBody>
+          <a:bodyPr/>
+          <a:lstStyle/>
+          <a:p>
+            <a:r>
+              <a:rPr lang="de-CH" i="1" dirty="0" smtClean="0"/>
+              <a:t>Marcel (Namen entfernen wir dann für </a:t>
+            </a:r>
+            <a:r>
+              <a:rPr lang="de-CH" i="1" dirty="0" err="1" smtClean="0"/>
+              <a:t>Präsi</a:t>
+            </a:r>
+            <a:r>
+              <a:rPr lang="de-CH" i="1" dirty="0" smtClean="0"/>
+              <a:t>):</a:t>
+            </a:r>
+            <a:endParaRPr lang="de-CH" i="1" dirty="0"/>
+          </a:p>
+          <a:p>
+            <a:pPr lvl="1"/>
+            <a:r>
+              <a:rPr lang="de-CH" dirty="0" smtClean="0"/>
+              <a:t>DEINE THEMEN</a:t>
+            </a:r>
+          </a:p>
+          <a:p>
+            <a:pPr lvl="1"/>
+            <a:r>
+              <a:rPr lang="de-CH" dirty="0" smtClean="0"/>
+              <a:t>Wikipedia-REST </a:t>
+            </a:r>
+            <a:r>
               <a:rPr lang="de-CH" dirty="0"/>
-              <a:t>Distribution </a:t>
+              <a:t>API- Präsentation Shop- </a:t>
+            </a:r>
+            <a:r>
+              <a:rPr lang="de-CH" dirty="0" smtClean="0"/>
+              <a:t>Model</a:t>
+            </a:r>
+            <a:br>
+              <a:rPr lang="de-CH" dirty="0" smtClean="0"/>
+            </a:br>
+            <a:r>
+              <a:rPr lang="de-CH" dirty="0" smtClean="0"/>
+              <a:t>Beispiel </a:t>
+            </a:r>
+            <a:r>
+              <a:rPr lang="de-CH" dirty="0"/>
+              <a:t>anhand </a:t>
+            </a:r>
+            <a:r>
+              <a:rPr lang="de-CH" dirty="0" smtClean="0"/>
+              <a:t>User Model </a:t>
+            </a:r>
+            <a:r>
+              <a:rPr lang="de-CH" dirty="0"/>
+              <a:t>(</a:t>
             </a:r>
             <a:r>
               <a:rPr lang="de-CH" dirty="0" err="1"/>
-              <a:t>among</a:t>
+              <a:t>create</a:t>
             </a:r>
             <a:r>
               <a:rPr lang="de-CH" dirty="0"/>
-              <a:t> </a:t>
+              <a:t> / </a:t>
             </a:r>
             <a:r>
               <a:rPr lang="de-CH" dirty="0" err="1"/>
-              <a:t>the</a:t>
+              <a:t>login</a:t>
             </a:r>
             <a:r>
               <a:rPr lang="de-CH" dirty="0"/>
-              <a:t> </a:t>
-            </a:r>
-            <a:r>
-              <a:rPr lang="de-CH" dirty="0" err="1"/>
-              <a:t>team</a:t>
-            </a:r>
+              <a:t>)</a:t>
+            </a:r>
+          </a:p>
+          <a:p>
             <a:endParaRPr lang="de-CH" dirty="0"/>
           </a:p>
         </p:txBody>
@@ -8826,7 +9067,7 @@
     </p:spTree>
     <p:extLst>
       <p:ext uri="{BB962C8B-B14F-4D97-AF65-F5344CB8AC3E}">
-        <p14:creationId xmlns:p14="http://schemas.microsoft.com/office/powerpoint/2010/main" val="1401125318"/>
+        <p14:creationId xmlns:p14="http://schemas.microsoft.com/office/powerpoint/2010/main" val="1221095212"/>
       </p:ext>
     </p:extLst>
   </p:cSld>
@@ -8836,7 +9077,7 @@
   <p:timing>
     <p:tnLst>
       <p:par>
-        <p:cTn id="1" dur="indefinite" restart="never" nodeType="tmRoot"/>
+        <p:cTn xmlns:p14="http://schemas.microsoft.com/office/powerpoint/2010/main" id="1" dur="indefinite" restart="never" nodeType="tmRoot"/>
       </p:par>
     </p:tnLst>
   </p:timing>
@@ -8862,52 +9103,7 @@
       </p:grpSpPr>
       <p:sp>
         <p:nvSpPr>
-          <p:cNvPr id="2" name="Content Placeholder 1"/>
-          <p:cNvSpPr>
-            <a:spLocks noGrp="1"/>
-          </p:cNvSpPr>
-          <p:nvPr>
-            <p:ph sz="half" idx="1"/>
-          </p:nvPr>
-        </p:nvSpPr>
-        <p:spPr/>
-        <p:txBody>
-          <a:bodyPr/>
-          <a:lstStyle/>
-          <a:p>
-            <a:r>
-              <a:rPr lang="en-US" dirty="0" smtClean="0"/>
-              <a:t>Distribution of work demands good planning – especially in teams where there’s a gap in skills &amp; experience</a:t>
-            </a:r>
-          </a:p>
-          <a:p>
-            <a:r>
-              <a:rPr lang="en-US" dirty="0" smtClean="0"/>
-              <a:t>As a beginner it’s a blessing to have skilled colleagues around you</a:t>
-            </a:r>
-          </a:p>
-          <a:p>
-            <a:pPr lvl="1"/>
-            <a:r>
-              <a:rPr lang="en-US" dirty="0" smtClean="0"/>
-              <a:t>CSS can be really tricky and might getting out of control without a proper hierarchy</a:t>
-            </a:r>
-          </a:p>
-          <a:p>
-            <a:r>
-              <a:rPr lang="en-US" dirty="0" smtClean="0"/>
-              <a:t>Handling of the repository tool with a suitable hierarchy and the possibility of versioning (unfortunately not available in GitHub)</a:t>
-            </a:r>
-          </a:p>
-          <a:p>
-            <a:pPr lvl="1"/>
-            <a:endParaRPr lang="en-US" dirty="0"/>
-          </a:p>
-        </p:txBody>
-      </p:sp>
-      <p:sp>
-        <p:nvSpPr>
-          <p:cNvPr id="3" name="Title 2"/>
+          <p:cNvPr id="7" name="Titel 6"/>
           <p:cNvSpPr>
             <a:spLocks noGrp="1"/>
           </p:cNvSpPr>
@@ -8921,17 +9117,370 @@
           <a:lstStyle/>
           <a:p>
             <a:r>
-              <a:rPr lang="en-US" dirty="0" smtClean="0"/>
-              <a:t>Lessons learnt &amp; Review</a:t>
-            </a:r>
-            <a:endParaRPr lang="en-US" dirty="0"/>
+              <a:rPr lang="de-CH" dirty="0" smtClean="0"/>
+              <a:t>Live Demonstration &amp; Features</a:t>
+            </a:r>
+            <a:endParaRPr lang="de-CH" dirty="0"/>
+          </a:p>
+        </p:txBody>
+      </p:sp>
+      <p:sp>
+        <p:nvSpPr>
+          <p:cNvPr id="8" name="Textplatzhalter 7"/>
+          <p:cNvSpPr>
+            <a:spLocks noGrp="1"/>
+          </p:cNvSpPr>
+          <p:nvPr>
+            <p:ph type="body" idx="1"/>
+          </p:nvPr>
+        </p:nvSpPr>
+        <p:spPr/>
+        <p:txBody>
+          <a:bodyPr/>
+          <a:lstStyle/>
+          <a:p>
+            <a:endParaRPr lang="de-CH" dirty="0"/>
+          </a:p>
+        </p:txBody>
+      </p:sp>
+      <p:sp>
+        <p:nvSpPr>
+          <p:cNvPr id="11" name="Textplatzhalter 10"/>
+          <p:cNvSpPr>
+            <a:spLocks noGrp="1"/>
+          </p:cNvSpPr>
+          <p:nvPr>
+            <p:ph type="body" idx="18"/>
+          </p:nvPr>
+        </p:nvSpPr>
+        <p:spPr/>
+        <p:txBody>
+          <a:bodyPr/>
+          <a:lstStyle/>
+          <a:p>
+            <a:endParaRPr lang="de-CH"/>
+          </a:p>
+        </p:txBody>
+      </p:sp>
+      <p:sp>
+        <p:nvSpPr>
+          <p:cNvPr id="9" name="Inhaltsplatzhalter 8"/>
+          <p:cNvSpPr>
+            <a:spLocks noGrp="1"/>
+          </p:cNvSpPr>
+          <p:nvPr>
+            <p:ph sz="half" idx="13"/>
+          </p:nvPr>
+        </p:nvSpPr>
+        <p:spPr>
+          <a:xfrm>
+            <a:off x="468000" y="1439230"/>
+            <a:ext cx="8171998" cy="3960000"/>
+          </a:xfrm>
+        </p:spPr>
+        <p:txBody>
+          <a:bodyPr/>
+          <a:lstStyle/>
+          <a:p>
+            <a:r>
+              <a:rPr lang="de-CH" i="1" dirty="0" smtClean="0"/>
+              <a:t>Fabian </a:t>
+            </a:r>
+            <a:r>
+              <a:rPr lang="de-CH" i="1" dirty="0"/>
+              <a:t>(Namen entfernen wir dann für </a:t>
+            </a:r>
+            <a:r>
+              <a:rPr lang="de-CH" i="1" dirty="0" err="1"/>
+              <a:t>Präsi</a:t>
+            </a:r>
+            <a:r>
+              <a:rPr lang="de-CH" i="1" dirty="0" smtClean="0"/>
+              <a:t>):</a:t>
+            </a:r>
+            <a:r>
+              <a:rPr lang="de-CH" dirty="0" smtClean="0"/>
+              <a:t>:</a:t>
+            </a:r>
+            <a:endParaRPr lang="de-CH" dirty="0"/>
+          </a:p>
+          <a:p>
+            <a:pPr lvl="1"/>
+            <a:r>
+              <a:rPr lang="de-CH" dirty="0" smtClean="0"/>
+              <a:t>Shopping </a:t>
+            </a:r>
+            <a:r>
+              <a:rPr lang="de-CH" dirty="0" err="1" smtClean="0"/>
+              <a:t>with</a:t>
+            </a:r>
+            <a:r>
+              <a:rPr lang="de-CH" dirty="0" smtClean="0"/>
+              <a:t> «</a:t>
+            </a:r>
+            <a:r>
+              <a:rPr lang="de-CH" dirty="0" err="1" smtClean="0"/>
+              <a:t>groot</a:t>
+            </a:r>
+            <a:r>
+              <a:rPr lang="de-CH" dirty="0" smtClean="0"/>
+              <a:t>»</a:t>
+            </a:r>
+          </a:p>
+          <a:p>
+            <a:pPr lvl="1"/>
+            <a:r>
+              <a:rPr lang="de-CH" dirty="0" smtClean="0"/>
+              <a:t>Shopping </a:t>
+            </a:r>
+            <a:r>
+              <a:rPr lang="de-CH" dirty="0" err="1" smtClean="0"/>
+              <a:t>cart</a:t>
+            </a:r>
+            <a:endParaRPr lang="de-CH" dirty="0" smtClean="0"/>
+          </a:p>
+          <a:p>
+            <a:pPr lvl="2"/>
+            <a:r>
+              <a:rPr lang="de-CH" dirty="0" smtClean="0"/>
+              <a:t>OOP </a:t>
+            </a:r>
+            <a:r>
+              <a:rPr lang="de-CH" dirty="0" err="1"/>
+              <a:t>e</a:t>
+            </a:r>
+            <a:r>
+              <a:rPr lang="de-CH" dirty="0" err="1" smtClean="0"/>
+              <a:t>lement</a:t>
+            </a:r>
+            <a:r>
+              <a:rPr lang="de-CH" dirty="0" smtClean="0"/>
+              <a:t> in PHP</a:t>
+            </a:r>
+          </a:p>
+          <a:p>
+            <a:pPr lvl="2"/>
+            <a:r>
+              <a:rPr lang="de-CH" dirty="0" err="1" smtClean="0"/>
+              <a:t>Cart</a:t>
+            </a:r>
+            <a:r>
+              <a:rPr lang="de-CH" dirty="0" smtClean="0"/>
+              <a:t> </a:t>
+            </a:r>
+            <a:r>
+              <a:rPr lang="de-CH" dirty="0" err="1" smtClean="0"/>
+              <a:t>temporarily</a:t>
+            </a:r>
+            <a:r>
+              <a:rPr lang="de-CH" dirty="0" smtClean="0"/>
+              <a:t> </a:t>
+            </a:r>
+            <a:r>
+              <a:rPr lang="de-CH" dirty="0" err="1" smtClean="0"/>
+              <a:t>stored</a:t>
+            </a:r>
+            <a:r>
+              <a:rPr lang="de-CH" dirty="0" smtClean="0"/>
+              <a:t> </a:t>
+            </a:r>
+            <a:r>
+              <a:rPr lang="de-CH" dirty="0" err="1" smtClean="0"/>
+              <a:t>as</a:t>
+            </a:r>
+            <a:r>
+              <a:rPr lang="de-CH" dirty="0" smtClean="0"/>
+              <a:t> a JSON </a:t>
+            </a:r>
+            <a:r>
+              <a:rPr lang="de-CH" dirty="0" err="1" smtClean="0"/>
+              <a:t>encoded</a:t>
+            </a:r>
+            <a:r>
+              <a:rPr lang="de-CH" dirty="0" smtClean="0"/>
+              <a:t> </a:t>
+            </a:r>
+            <a:r>
+              <a:rPr lang="de-CH" dirty="0" err="1" smtClean="0"/>
+              <a:t>array</a:t>
+            </a:r>
+            <a:r>
+              <a:rPr lang="de-CH" dirty="0" smtClean="0"/>
+              <a:t> in </a:t>
+            </a:r>
+            <a:r>
+              <a:rPr lang="de-CH" smtClean="0"/>
+              <a:t>a Cookie</a:t>
+            </a:r>
+          </a:p>
+          <a:p>
+            <a:pPr lvl="2"/>
+            <a:r>
+              <a:rPr lang="de-CH" smtClean="0"/>
+              <a:t>Creating</a:t>
+            </a:r>
+            <a:r>
+              <a:rPr lang="de-CH" dirty="0" smtClean="0"/>
+              <a:t> </a:t>
+            </a:r>
+            <a:r>
+              <a:rPr lang="de-CH" dirty="0" err="1" smtClean="0"/>
+              <a:t>of</a:t>
+            </a:r>
+            <a:r>
+              <a:rPr lang="de-CH" dirty="0" smtClean="0"/>
+              <a:t> a </a:t>
+            </a:r>
+            <a:r>
+              <a:rPr lang="de-CH" dirty="0" err="1" smtClean="0"/>
+              <a:t>shopping</a:t>
+            </a:r>
+            <a:r>
+              <a:rPr lang="de-CH" dirty="0" smtClean="0"/>
+              <a:t> </a:t>
+            </a:r>
+            <a:r>
+              <a:rPr lang="de-CH" dirty="0" err="1" smtClean="0"/>
+              <a:t>cart</a:t>
+            </a:r>
+            <a:r>
+              <a:rPr lang="de-CH" dirty="0" smtClean="0"/>
+              <a:t> </a:t>
+            </a:r>
+            <a:r>
+              <a:rPr lang="de-CH" dirty="0" err="1" smtClean="0"/>
+              <a:t>object</a:t>
+            </a:r>
+            <a:r>
+              <a:rPr lang="de-CH" dirty="0" smtClean="0"/>
+              <a:t> </a:t>
+            </a:r>
+            <a:r>
+              <a:rPr lang="de-CH" dirty="0" err="1" smtClean="0"/>
+              <a:t>by</a:t>
+            </a:r>
+            <a:r>
+              <a:rPr lang="de-CH" dirty="0" smtClean="0"/>
+              <a:t> </a:t>
+            </a:r>
+            <a:r>
+              <a:rPr lang="de-CH" dirty="0" err="1" smtClean="0"/>
+              <a:t>using</a:t>
+            </a:r>
+            <a:r>
+              <a:rPr lang="de-CH" dirty="0" smtClean="0"/>
+              <a:t> </a:t>
+            </a:r>
+            <a:r>
+              <a:rPr lang="de-CH" dirty="0" err="1" smtClean="0"/>
+              <a:t>the</a:t>
+            </a:r>
+            <a:r>
+              <a:rPr lang="de-CH" dirty="0" smtClean="0"/>
+              <a:t> </a:t>
+            </a:r>
+            <a:r>
+              <a:rPr lang="de-CH" dirty="0" err="1" smtClean="0"/>
+              <a:t>array</a:t>
+            </a:r>
+            <a:r>
+              <a:rPr lang="de-CH" dirty="0" smtClean="0"/>
+              <a:t> in </a:t>
+            </a:r>
+            <a:r>
+              <a:rPr lang="de-CH" dirty="0" err="1" smtClean="0"/>
+              <a:t>order</a:t>
+            </a:r>
+            <a:r>
+              <a:rPr lang="de-CH" dirty="0" smtClean="0"/>
+              <a:t> to have </a:t>
+            </a:r>
+            <a:r>
+              <a:rPr lang="de-CH" dirty="0" err="1" smtClean="0"/>
+              <a:t>access</a:t>
+            </a:r>
+            <a:r>
+              <a:rPr lang="de-CH" dirty="0" smtClean="0"/>
+              <a:t> to </a:t>
+            </a:r>
+            <a:r>
+              <a:rPr lang="de-CH" dirty="0" err="1" smtClean="0"/>
+              <a:t>functions</a:t>
+            </a:r>
+            <a:r>
+              <a:rPr lang="de-CH" dirty="0" smtClean="0"/>
+              <a:t> like </a:t>
+            </a:r>
+            <a:r>
+              <a:rPr lang="de-CH" dirty="0" err="1" smtClean="0"/>
+              <a:t>calculate</a:t>
+            </a:r>
+            <a:r>
+              <a:rPr lang="de-CH" dirty="0" smtClean="0"/>
+              <a:t> </a:t>
+            </a:r>
+            <a:r>
+              <a:rPr lang="de-CH" dirty="0" err="1" smtClean="0"/>
+              <a:t>price</a:t>
+            </a:r>
+            <a:r>
+              <a:rPr lang="de-CH" dirty="0" smtClean="0"/>
+              <a:t> &amp; </a:t>
+            </a:r>
+            <a:r>
+              <a:rPr lang="de-CH" dirty="0" err="1" smtClean="0"/>
+              <a:t>display</a:t>
+            </a:r>
+            <a:r>
+              <a:rPr lang="de-CH" dirty="0" smtClean="0"/>
+              <a:t> </a:t>
+            </a:r>
+            <a:r>
+              <a:rPr lang="de-CH" dirty="0" err="1" smtClean="0"/>
+              <a:t>the</a:t>
+            </a:r>
+            <a:r>
+              <a:rPr lang="de-CH" dirty="0" smtClean="0"/>
+              <a:t> </a:t>
+            </a:r>
+            <a:r>
+              <a:rPr lang="de-CH" dirty="0" err="1" smtClean="0"/>
+              <a:t>cart</a:t>
+            </a:r>
+            <a:r>
+              <a:rPr lang="de-CH" dirty="0" smtClean="0"/>
+              <a:t> </a:t>
+            </a:r>
+          </a:p>
+          <a:p>
+            <a:pPr lvl="2"/>
+            <a:r>
+              <a:rPr lang="de-CH" dirty="0" err="1" smtClean="0"/>
+              <a:t>Ordering</a:t>
+            </a:r>
+            <a:r>
+              <a:rPr lang="de-CH" dirty="0" smtClean="0"/>
+              <a:t> </a:t>
+            </a:r>
+            <a:r>
+              <a:rPr lang="de-CH" dirty="0" err="1" smtClean="0"/>
+              <a:t>process</a:t>
+            </a:r>
+            <a:endParaRPr lang="de-CH" dirty="0" smtClean="0"/>
+          </a:p>
+          <a:p>
+            <a:pPr lvl="1"/>
+            <a:r>
+              <a:rPr lang="de-CH" dirty="0" smtClean="0"/>
+              <a:t>Layout</a:t>
+            </a:r>
           </a:p>
         </p:txBody>
       </p:sp>
     </p:spTree>
     <p:extLst>
       <p:ext uri="{BB962C8B-B14F-4D97-AF65-F5344CB8AC3E}">
-        <p14:creationId xmlns:p14="http://schemas.microsoft.com/office/powerpoint/2010/main" val="2865284130"/>
+        <p14:creationId xmlns:p14="http://schemas.microsoft.com/office/powerpoint/2010/main" val="291798853"/>
       </p:ext>
     </p:extLst>
   </p:cSld>
@@ -8941,7 +9490,7 @@
   <p:timing>
     <p:tnLst>
       <p:par>
-        <p:cTn id="1" dur="indefinite" restart="never" nodeType="tmRoot"/>
+        <p:cTn xmlns:p14="http://schemas.microsoft.com/office/powerpoint/2010/main" id="1" dur="indefinite" restart="never" nodeType="tmRoot"/>
       </p:par>
     </p:tnLst>
   </p:timing>

</xml_diff>

<commit_message>
tschm23 teil zur präsentation hinzugefügt
</commit_message>
<xml_diff>
--- a/trunk/doc/Presentation.pptx
+++ b/trunk/doc/Presentation.pptx
@@ -307,7 +307,7 @@
           <a:p>
             <a:fld id="{5F377753-DB7C-4FA7-98FC-17681D88797A}" type="slidenum">
               <a:rPr lang="de-CH" smtClean="0"/>
-              <a:t>‹#›</a:t>
+              <a:t>‹Nr.›</a:t>
             </a:fld>
             <a:endParaRPr lang="de-CH"/>
           </a:p>
@@ -570,7 +570,7 @@
           <a:p>
             <a:fld id="{37E44704-8E6D-4CF2-8CFA-A0F7BC751896}" type="slidenum">
               <a:rPr lang="de-CH" smtClean="0"/>
-              <a:t>‹#›</a:t>
+              <a:t>‹Nr.›</a:t>
             </a:fld>
             <a:endParaRPr lang="de-CH"/>
           </a:p>
@@ -2137,7 +2137,7 @@
           <a:p>
             <a:fld id="{F19AE9A8-34D4-4E8C-BE9C-13C550F1BED0}" type="slidenum">
               <a:rPr lang="de-CH" smtClean="0"/>
-              <a:t>‹#›</a:t>
+              <a:t>‹Nr.›</a:t>
             </a:fld>
             <a:endParaRPr lang="de-CH" dirty="0"/>
           </a:p>
@@ -2190,7 +2190,7 @@
           <a:p>
             <a:fld id="{F19AE9A8-34D4-4E8C-BE9C-13C550F1BED0}" type="slidenum">
               <a:rPr lang="de-CH" smtClean="0"/>
-              <a:t>‹#›</a:t>
+              <a:t>‹Nr.›</a:t>
             </a:fld>
             <a:endParaRPr lang="de-CH" dirty="0"/>
           </a:p>
@@ -3263,7 +3263,7 @@
           <a:p>
             <a:fld id="{F19AE9A8-34D4-4E8C-BE9C-13C550F1BED0}" type="slidenum">
               <a:rPr lang="de-CH" smtClean="0"/>
-              <a:t>‹#›</a:t>
+              <a:t>‹Nr.›</a:t>
             </a:fld>
             <a:endParaRPr lang="de-CH" dirty="0"/>
           </a:p>
@@ -3659,7 +3659,7 @@
           <a:p>
             <a:fld id="{F19AE9A8-34D4-4E8C-BE9C-13C550F1BED0}" type="slidenum">
               <a:rPr lang="de-CH" smtClean="0"/>
-              <a:t>‹#›</a:t>
+              <a:t>‹Nr.›</a:t>
             </a:fld>
             <a:endParaRPr lang="de-CH" dirty="0"/>
           </a:p>
@@ -3893,7 +3893,7 @@
           <a:p>
             <a:fld id="{F19AE9A8-34D4-4E8C-BE9C-13C550F1BED0}" type="slidenum">
               <a:rPr lang="de-CH" smtClean="0"/>
-              <a:t>‹#›</a:t>
+              <a:t>‹Nr.›</a:t>
             </a:fld>
             <a:endParaRPr lang="de-CH" dirty="0"/>
           </a:p>
@@ -4202,7 +4202,7 @@
           <a:p>
             <a:fld id="{F19AE9A8-34D4-4E8C-BE9C-13C550F1BED0}" type="slidenum">
               <a:rPr lang="de-CH" smtClean="0"/>
-              <a:t>‹#›</a:t>
+              <a:t>‹Nr.›</a:t>
             </a:fld>
             <a:endParaRPr lang="de-CH" dirty="0"/>
           </a:p>
@@ -4732,7 +4732,7 @@
           <a:p>
             <a:fld id="{F19AE9A8-34D4-4E8C-BE9C-13C550F1BED0}" type="slidenum">
               <a:rPr lang="de-CH" smtClean="0"/>
-              <a:t>‹#›</a:t>
+              <a:t>‹Nr.›</a:t>
             </a:fld>
             <a:endParaRPr lang="de-CH" dirty="0"/>
           </a:p>
@@ -5262,7 +5262,7 @@
           <a:p>
             <a:fld id="{F19AE9A8-34D4-4E8C-BE9C-13C550F1BED0}" type="slidenum">
               <a:rPr lang="de-CH" smtClean="0"/>
-              <a:t>‹#›</a:t>
+              <a:t>‹Nr.›</a:t>
             </a:fld>
             <a:endParaRPr lang="de-CH" dirty="0"/>
           </a:p>
@@ -5989,7 +5989,7 @@
           <a:p>
             <a:fld id="{F19AE9A8-34D4-4E8C-BE9C-13C550F1BED0}" type="slidenum">
               <a:rPr lang="de-CH" smtClean="0"/>
-              <a:t>‹#›</a:t>
+              <a:t>‹Nr.›</a:t>
             </a:fld>
             <a:endParaRPr lang="de-CH" dirty="0"/>
           </a:p>
@@ -6375,7 +6375,7 @@
             <a:fld id="{F19AE9A8-34D4-4E8C-BE9C-13C550F1BED0}" type="slidenum">
               <a:rPr lang="de-CH" smtClean="0"/>
               <a:pPr/>
-              <a:t>‹#›</a:t>
+              <a:t>‹Nr.›</a:t>
             </a:fld>
             <a:endParaRPr lang="de-CH" dirty="0"/>
           </a:p>
@@ -7380,8 +7380,27 @@
             <a:pPr lvl="1"/>
             <a:r>
               <a:rPr lang="en-US" dirty="0" smtClean="0"/>
-              <a:t>CSS can be really tricky and might getting out of control without a proper hierarchy</a:t>
-            </a:r>
+              <a:t>CSS can be really tricky and might getting out of control without a proper </a:t>
+            </a:r>
+            <a:r>
+              <a:rPr lang="en-US" dirty="0" smtClean="0"/>
+              <a:t>hierarchy</a:t>
+            </a:r>
+          </a:p>
+          <a:p>
+            <a:r>
+              <a:rPr lang="en-US" dirty="0" smtClean="0"/>
+              <a:t>If you do it, do it right (translations</a:t>
+            </a:r>
+            <a:r>
+              <a:rPr lang="en-US" dirty="0"/>
+              <a:t>, encapsulation, </a:t>
+            </a:r>
+            <a:r>
+              <a:rPr lang="en-US" dirty="0" smtClean="0"/>
+              <a:t>commenting…)</a:t>
+            </a:r>
+            <a:endParaRPr lang="en-US" dirty="0" smtClean="0"/>
           </a:p>
           <a:p>
             <a:pPr marL="0" indent="0">
@@ -7856,12 +7875,8 @@
               <a:t>learnt</a:t>
             </a:r>
             <a:r>
-              <a:rPr lang="de-CH" dirty="0"/>
-              <a:t> </a:t>
-            </a:r>
-            <a:r>
               <a:rPr lang="de-CH" dirty="0" smtClean="0"/>
-              <a:t>&amp; </a:t>
+              <a:t> &amp; </a:t>
             </a:r>
             <a:r>
               <a:rPr lang="de-CH" dirty="0" err="1" smtClean="0"/>
@@ -7925,15 +7940,7 @@
           <a:p>
             <a:r>
               <a:rPr lang="en-US" dirty="0" smtClean="0"/>
-              <a:t>Standard project without the support of a </a:t>
-            </a:r>
-            <a:r>
-              <a:rPr lang="en-US" dirty="0" smtClean="0"/>
-              <a:t>backend-framework</a:t>
-            </a:r>
-            <a:r>
-              <a:rPr lang="en-US" dirty="0" smtClean="0"/>
-              <a:t>: </a:t>
+              <a:t>Standard project without the support of a backend-framework: </a:t>
             </a:r>
           </a:p>
           <a:p>
@@ -8005,12 +8012,20 @@
           <a:p>
             <a:pPr lvl="1"/>
             <a:r>
-              <a:rPr lang="en-US" dirty="0" smtClean="0">
-                <a:solidFill>
-                  <a:srgbClr val="FF0000"/>
-                </a:solidFill>
-              </a:rPr>
-              <a:t>Marcel:</a:t>
+              <a:rPr lang="en-US" dirty="0" smtClean="0"/>
+              <a:t>Marcel</a:t>
+            </a:r>
+            <a:r>
+              <a:rPr lang="en-US" dirty="0" smtClean="0"/>
+              <a:t>: Web-Developer (</a:t>
+            </a:r>
+            <a:r>
+              <a:rPr lang="en-US" dirty="0" err="1" smtClean="0"/>
+              <a:t>Webflow</a:t>
+            </a:r>
+            <a:r>
+              <a:rPr lang="en-US" dirty="0" smtClean="0"/>
+              <a:t>)</a:t>
             </a:r>
             <a:r>
               <a:rPr lang="en-US" dirty="0" smtClean="0"/>
@@ -8238,7 +8253,15 @@
             </a:r>
             <a:r>
               <a:rPr lang="en-US" dirty="0"/>
-              <a:t>for storing the </a:t>
+              <a:t>for </a:t>
+            </a:r>
+            <a:r>
+              <a:rPr lang="en-US" dirty="0" smtClean="0"/>
+              <a:t>storing </a:t>
+            </a:r>
+            <a:r>
+              <a:rPr lang="en-US" dirty="0"/>
+              <a:t>the </a:t>
             </a:r>
             <a:r>
               <a:rPr lang="en-US" dirty="0" smtClean="0"/>
@@ -8920,82 +8943,178 @@
           <a:bodyPr/>
           <a:lstStyle/>
           <a:p>
-            <a:r>
-              <a:rPr lang="de-CH" i="1" dirty="0" smtClean="0"/>
-              <a:t>Marcel (Namen entfernen wir dann für </a:t>
-            </a:r>
-            <a:r>
-              <a:rPr lang="de-CH" i="1" dirty="0" err="1" smtClean="0"/>
-              <a:t>Präsi</a:t>
-            </a:r>
-            <a:r>
-              <a:rPr lang="de-CH" i="1" dirty="0" smtClean="0"/>
-              <a:t>):</a:t>
-            </a:r>
-            <a:endParaRPr lang="de-CH" i="1" dirty="0"/>
-          </a:p>
-          <a:p>
-            <a:pPr lvl="1"/>
+            <a:endParaRPr lang="de-CH" dirty="0" smtClean="0"/>
+          </a:p>
+          <a:p>
+            <a:endParaRPr lang="de-CH" dirty="0"/>
+          </a:p>
+          <a:p>
             <a:r>
               <a:rPr lang="de-CH" dirty="0" smtClean="0"/>
-              <a:t>DEINE THEMEN</a:t>
-            </a:r>
-          </a:p>
-          <a:p>
-            <a:pPr lvl="1"/>
+              <a:t>Login</a:t>
+            </a:r>
+          </a:p>
+          <a:p>
+            <a:r>
+              <a:rPr lang="de-CH" dirty="0" err="1" smtClean="0"/>
+              <a:t>Translations</a:t>
+            </a:r>
+            <a:endParaRPr lang="de-CH" dirty="0" smtClean="0"/>
+          </a:p>
+          <a:p>
             <a:r>
               <a:rPr lang="de-CH" dirty="0" smtClean="0"/>
-              <a:t>Wikipedia-REST </a:t>
-            </a:r>
-            <a:r>
-              <a:rPr lang="de-CH" dirty="0"/>
-              <a:t>API- Präsentation Shop- </a:t>
-            </a:r>
+              <a:t>Genres &amp; </a:t>
+            </a:r>
+            <a:r>
+              <a:rPr lang="de-CH" dirty="0" err="1" smtClean="0"/>
+              <a:t>Searching</a:t>
+            </a:r>
+            <a:endParaRPr lang="de-CH" dirty="0"/>
+          </a:p>
+          <a:p>
             <a:r>
               <a:rPr lang="de-CH" dirty="0" smtClean="0"/>
-              <a:t>Model</a:t>
-            </a:r>
-            <a:br>
+              <a:t>Wikipedia-REST</a:t>
+            </a:r>
+          </a:p>
+          <a:p>
+            <a:r>
               <a:rPr lang="de-CH" dirty="0" smtClean="0"/>
-            </a:br>
-            <a:r>
-              <a:rPr lang="de-CH" dirty="0" smtClean="0"/>
-              <a:t>Beispiel </a:t>
-            </a:r>
-            <a:r>
-              <a:rPr lang="de-CH" dirty="0"/>
-              <a:t>anhand </a:t>
-            </a:r>
-            <a:r>
-              <a:rPr lang="de-CH" dirty="0" smtClean="0"/>
-              <a:t>User Model </a:t>
-            </a:r>
-            <a:r>
-              <a:rPr lang="de-CH" dirty="0"/>
-              <a:t>(</a:t>
-            </a:r>
-            <a:r>
-              <a:rPr lang="de-CH" dirty="0" err="1"/>
-              <a:t>create</a:t>
-            </a:r>
-            <a:r>
-              <a:rPr lang="de-CH" dirty="0"/>
-              <a:t> / </a:t>
-            </a:r>
-            <a:r>
-              <a:rPr lang="de-CH" dirty="0" err="1"/>
-              <a:t>login</a:t>
-            </a:r>
-            <a:r>
-              <a:rPr lang="de-CH" dirty="0"/>
-              <a:t>)</a:t>
-            </a:r>
-          </a:p>
-          <a:p>
+              <a:t>User Model</a:t>
+            </a:r>
             <a:endParaRPr lang="de-CH" dirty="0"/>
           </a:p>
         </p:txBody>
       </p:sp>
+      <p:pic>
+        <p:nvPicPr>
+          <p:cNvPr id="1026" name="Picture 2"/>
+          <p:cNvPicPr>
+            <a:picLocks noChangeAspect="1" noChangeArrowheads="1"/>
+          </p:cNvPicPr>
+          <p:nvPr/>
+        </p:nvPicPr>
+        <p:blipFill>
+          <a:blip r:embed="rId2">
+            <a:extLst>
+              <a:ext uri="{28A0092B-C50C-407E-A947-70E740481C1C}">
+                <a14:useLocalDpi xmlns:a14="http://schemas.microsoft.com/office/drawing/2010/main" val="0"/>
+              </a:ext>
+            </a:extLst>
+          </a:blip>
+          <a:srcRect/>
+          <a:stretch>
+            <a:fillRect/>
+          </a:stretch>
+        </p:blipFill>
+        <p:spPr bwMode="auto">
+          <a:xfrm>
+            <a:off x="3024148" y="3773550"/>
+            <a:ext cx="4657725" cy="914400"/>
+          </a:xfrm>
+          <a:prstGeom prst="rect">
+            <a:avLst/>
+          </a:prstGeom>
+          <a:noFill/>
+          <a:ln>
+            <a:noFill/>
+          </a:ln>
+          <a:effectLst/>
+          <a:extLst>
+            <a:ext uri="{909E8E84-426E-40DD-AFC4-6F175D3DCCD1}">
+              <a14:hiddenFill xmlns:a14="http://schemas.microsoft.com/office/drawing/2010/main">
+                <a:solidFill>
+                  <a:schemeClr val="accent1"/>
+                </a:solidFill>
+              </a14:hiddenFill>
+            </a:ext>
+            <a:ext uri="{91240B29-F687-4F45-9708-019B960494DF}">
+              <a14:hiddenLine xmlns:a14="http://schemas.microsoft.com/office/drawing/2010/main" w="9525">
+                <a:solidFill>
+                  <a:schemeClr val="tx1"/>
+                </a:solidFill>
+                <a:miter lim="800000"/>
+                <a:headEnd/>
+                <a:tailEnd/>
+              </a14:hiddenLine>
+            </a:ext>
+            <a:ext uri="{AF507438-7753-43E0-B8FC-AC1667EBCBE1}">
+              <a14:hiddenEffects xmlns:a14="http://schemas.microsoft.com/office/drawing/2010/main">
+                <a:effectLst>
+                  <a:outerShdw dist="35921" dir="2700000" algn="ctr" rotWithShape="0">
+                    <a:schemeClr val="bg2"/>
+                  </a:outerShdw>
+                </a:effectLst>
+              </a14:hiddenEffects>
+            </a:ext>
+          </a:extLst>
+        </p:spPr>
+      </p:pic>
+      <p:pic>
+        <p:nvPicPr>
+          <p:cNvPr id="1027" name="Picture 3"/>
+          <p:cNvPicPr>
+            <a:picLocks noChangeAspect="1" noChangeArrowheads="1"/>
+          </p:cNvPicPr>
+          <p:nvPr/>
+        </p:nvPicPr>
+        <p:blipFill>
+          <a:blip r:embed="rId3">
+            <a:extLst>
+              <a:ext uri="{28A0092B-C50C-407E-A947-70E740481C1C}">
+                <a14:useLocalDpi xmlns:a14="http://schemas.microsoft.com/office/drawing/2010/main" val="0"/>
+              </a:ext>
+            </a:extLst>
+          </a:blip>
+          <a:srcRect/>
+          <a:stretch>
+            <a:fillRect/>
+          </a:stretch>
+        </p:blipFill>
+        <p:spPr bwMode="auto">
+          <a:xfrm>
+            <a:off x="3024148" y="1508938"/>
+            <a:ext cx="5362575" cy="1866900"/>
+          </a:xfrm>
+          <a:prstGeom prst="rect">
+            <a:avLst/>
+          </a:prstGeom>
+          <a:noFill/>
+          <a:ln>
+            <a:noFill/>
+          </a:ln>
+          <a:effectLst/>
+          <a:extLst>
+            <a:ext uri="{909E8E84-426E-40DD-AFC4-6F175D3DCCD1}">
+              <a14:hiddenFill xmlns:a14="http://schemas.microsoft.com/office/drawing/2010/main">
+                <a:solidFill>
+                  <a:schemeClr val="accent1"/>
+                </a:solidFill>
+              </a14:hiddenFill>
+            </a:ext>
+            <a:ext uri="{91240B29-F687-4F45-9708-019B960494DF}">
+              <a14:hiddenLine xmlns:a14="http://schemas.microsoft.com/office/drawing/2010/main" w="9525">
+                <a:solidFill>
+                  <a:schemeClr val="tx1"/>
+                </a:solidFill>
+                <a:miter lim="800000"/>
+                <a:headEnd/>
+                <a:tailEnd/>
+              </a14:hiddenLine>
+            </a:ext>
+            <a:ext uri="{AF507438-7753-43E0-B8FC-AC1667EBCBE1}">
+              <a14:hiddenEffects xmlns:a14="http://schemas.microsoft.com/office/drawing/2010/main">
+                <a:effectLst>
+                  <a:outerShdw dist="35921" dir="2700000" algn="ctr" rotWithShape="0">
+                    <a:schemeClr val="bg2"/>
+                  </a:outerShdw>
+                </a:effectLst>
+              </a14:hiddenEffects>
+            </a:ext>
+          </a:extLst>
+        </p:spPr>
+      </p:pic>
     </p:spTree>
     <p:extLst>
       <p:ext uri="{BB962C8B-B14F-4D97-AF65-F5344CB8AC3E}">
@@ -10225,6 +10344,33 @@
 </file>
 
 <file path=customXml/item1.xml><?xml version="1.0" encoding="utf-8"?>
+<p:properties xmlns:p="http://schemas.microsoft.com/office/2006/metadata/properties" xmlns:xsi="http://www.w3.org/2001/XMLSchema-instance" xmlns:pc="http://schemas.microsoft.com/office/infopath/2007/PartnerControls">
+  <documentManagement>
+    <TaxCatchAll xmlns="2551ef7e-3b29-44d1-a8ad-ef34c26bfc60">
+      <Value>241</Value>
+    </TaxCatchAll>
+    <BfhIntranetDepartmentText xmlns="4b463c31-e9b0-413b-88df-ea7e9f53a7ba">
+      <Terms xmlns="http://schemas.microsoft.com/office/infopath/2007/PartnerControls">
+        <TermInfo xmlns="http://schemas.microsoft.com/office/infopath/2007/PartnerControls">
+          <TermName xmlns="http://schemas.microsoft.com/office/infopath/2007/PartnerControls">Vorlage</TermName>
+          <TermId xmlns="http://schemas.microsoft.com/office/infopath/2007/PartnerControls">de1a6d3c-ac6a-4b34-8edd-308eb81066db</TermId>
+        </TermInfo>
+      </Terms>
+    </BfhIntranetDepartmentText>
+  </documentManagement>
+</p:properties>
+</file>
+
+<file path=customXml/item2.xml><?xml version="1.0" encoding="utf-8"?>
+<?mso-contentType ?>
+<FormTemplates xmlns="http://schemas.microsoft.com/sharepoint/v3/contenttype/forms">
+  <Display>DocumentLibraryForm</Display>
+  <Edit>DocumentLibraryForm</Edit>
+  <New>DocumentLibraryForm</New>
+</FormTemplates>
+</file>
+
+<file path=customXml/item3.xml><?xml version="1.0" encoding="utf-8"?>
 <ct:contentTypeSchema xmlns:ct="http://schemas.microsoft.com/office/2006/metadata/contentType" xmlns:ma="http://schemas.microsoft.com/office/2006/metadata/properties/metaAttributes" ct:_="" ma:_="" ma:contentTypeName="BFH Document" ma:contentTypeID="0x0101009127C3B567804923A8661E062BBD8EF500562C9D82744B284A86093F1D9B579BDC" ma:contentTypeVersion="2" ma:contentTypeDescription="Ein neues Dokument erstellen." ma:contentTypeScope="" ma:versionID="85c74107ca2205fa2d79ffbd44cb7ca7">
   <xsd:schema xmlns:xsd="http://www.w3.org/2001/XMLSchema" xmlns:xs="http://www.w3.org/2001/XMLSchema" xmlns:p="http://schemas.microsoft.com/office/2006/metadata/properties" xmlns:ns2="4b463c31-e9b0-413b-88df-ea7e9f53a7ba" xmlns:ns3="2551ef7e-3b29-44d1-a8ad-ef34c26bfc60" targetNamespace="http://schemas.microsoft.com/office/2006/metadata/properties" ma:root="true" ma:fieldsID="850aabddd6d95701c4b28714f3a316c8" ns2:_="" ns3:_="">
     <xsd:import namespace="4b463c31-e9b0-413b-88df-ea7e9f53a7ba"/>
@@ -10369,34 +10515,32 @@
 </ct:contentTypeSchema>
 </file>
 
-<file path=customXml/item2.xml><?xml version="1.0" encoding="utf-8"?>
-<?mso-contentType ?>
-<FormTemplates xmlns="http://schemas.microsoft.com/sharepoint/v3/contenttype/forms">
-  <Display>DocumentLibraryForm</Display>
-  <Edit>DocumentLibraryForm</Edit>
-  <New>DocumentLibraryForm</New>
-</FormTemplates>
+<file path=customXml/itemProps1.xml><?xml version="1.0" encoding="utf-8"?>
+<ds:datastoreItem xmlns:ds="http://schemas.openxmlformats.org/officeDocument/2006/customXml" ds:itemID="{96591048-6F15-48C6-9650-9BFF3E56974F}">
+  <ds:schemaRefs>
+    <ds:schemaRef ds:uri="http://purl.org/dc/elements/1.1/"/>
+    <ds:schemaRef ds:uri="4b463c31-e9b0-413b-88df-ea7e9f53a7ba"/>
+    <ds:schemaRef ds:uri="http://purl.org/dc/terms/"/>
+    <ds:schemaRef ds:uri="http://schemas.microsoft.com/office/2006/metadata/properties"/>
+    <ds:schemaRef ds:uri="http://schemas.microsoft.com/office/2006/documentManagement/types"/>
+    <ds:schemaRef ds:uri="http://purl.org/dc/dcmitype/"/>
+    <ds:schemaRef ds:uri="http://www.w3.org/XML/1998/namespace"/>
+    <ds:schemaRef ds:uri="http://schemas.microsoft.com/office/infopath/2007/PartnerControls"/>
+    <ds:schemaRef ds:uri="http://schemas.openxmlformats.org/package/2006/metadata/core-properties"/>
+    <ds:schemaRef ds:uri="2551ef7e-3b29-44d1-a8ad-ef34c26bfc60"/>
+  </ds:schemaRefs>
+</ds:datastoreItem>
 </file>
 
-<file path=customXml/item3.xml><?xml version="1.0" encoding="utf-8"?>
-<p:properties xmlns:p="http://schemas.microsoft.com/office/2006/metadata/properties" xmlns:xsi="http://www.w3.org/2001/XMLSchema-instance" xmlns:pc="http://schemas.microsoft.com/office/infopath/2007/PartnerControls">
-  <documentManagement>
-    <TaxCatchAll xmlns="2551ef7e-3b29-44d1-a8ad-ef34c26bfc60">
-      <Value>241</Value>
-    </TaxCatchAll>
-    <BfhIntranetDepartmentText xmlns="4b463c31-e9b0-413b-88df-ea7e9f53a7ba">
-      <Terms xmlns="http://schemas.microsoft.com/office/infopath/2007/PartnerControls">
-        <TermInfo xmlns="http://schemas.microsoft.com/office/infopath/2007/PartnerControls">
-          <TermName xmlns="http://schemas.microsoft.com/office/infopath/2007/PartnerControls">Vorlage</TermName>
-          <TermId xmlns="http://schemas.microsoft.com/office/infopath/2007/PartnerControls">de1a6d3c-ac6a-4b34-8edd-308eb81066db</TermId>
-        </TermInfo>
-      </Terms>
-    </BfhIntranetDepartmentText>
-  </documentManagement>
-</p:properties>
+<file path=customXml/itemProps2.xml><?xml version="1.0" encoding="utf-8"?>
+<ds:datastoreItem xmlns:ds="http://schemas.openxmlformats.org/officeDocument/2006/customXml" ds:itemID="{CCF5E5E7-7F77-47A8-99A9-B4D5839292F3}">
+  <ds:schemaRefs>
+    <ds:schemaRef ds:uri="http://schemas.microsoft.com/sharepoint/v3/contenttype/forms"/>
+  </ds:schemaRefs>
+</ds:datastoreItem>
 </file>
 
-<file path=customXml/itemProps1.xml><?xml version="1.0" encoding="utf-8"?>
+<file path=customXml/itemProps3.xml><?xml version="1.0" encoding="utf-8"?>
 <ds:datastoreItem xmlns:ds="http://schemas.openxmlformats.org/officeDocument/2006/customXml" ds:itemID="{8F3C1F62-CC3B-4F2A-BAEC-F8005B132EC9}">
   <ds:schemaRefs>
     <ds:schemaRef ds:uri="http://schemas.microsoft.com/office/2006/metadata/contentType"/>
@@ -10413,29 +10557,4 @@
     <ds:schemaRef ds:uri="http://schemas.microsoft.com/internal/obd"/>
   </ds:schemaRefs>
 </ds:datastoreItem>
-</file>
-
-<file path=customXml/itemProps2.xml><?xml version="1.0" encoding="utf-8"?>
-<ds:datastoreItem xmlns:ds="http://schemas.openxmlformats.org/officeDocument/2006/customXml" ds:itemID="{CCF5E5E7-7F77-47A8-99A9-B4D5839292F3}">
-  <ds:schemaRefs>
-    <ds:schemaRef ds:uri="http://schemas.microsoft.com/sharepoint/v3/contenttype/forms"/>
-  </ds:schemaRefs>
-</ds:datastoreItem>
-</file>
-
-<file path=customXml/itemProps3.xml><?xml version="1.0" encoding="utf-8"?>
-<ds:datastoreItem xmlns:ds="http://schemas.openxmlformats.org/officeDocument/2006/customXml" ds:itemID="{96591048-6F15-48C6-9650-9BFF3E56974F}">
-  <ds:schemaRefs>
-    <ds:schemaRef ds:uri="http://purl.org/dc/elements/1.1/"/>
-    <ds:schemaRef ds:uri="4b463c31-e9b0-413b-88df-ea7e9f53a7ba"/>
-    <ds:schemaRef ds:uri="http://purl.org/dc/terms/"/>
-    <ds:schemaRef ds:uri="http://schemas.microsoft.com/office/2006/metadata/properties"/>
-    <ds:schemaRef ds:uri="http://schemas.microsoft.com/office/2006/documentManagement/types"/>
-    <ds:schemaRef ds:uri="http://purl.org/dc/dcmitype/"/>
-    <ds:schemaRef ds:uri="http://www.w3.org/XML/1998/namespace"/>
-    <ds:schemaRef ds:uri="http://schemas.microsoft.com/office/infopath/2007/PartnerControls"/>
-    <ds:schemaRef ds:uri="http://schemas.openxmlformats.org/package/2006/metadata/core-properties"/>
-    <ds:schemaRef ds:uri="2551ef7e-3b29-44d1-a8ad-ef34c26bfc60"/>
-  </ds:schemaRefs>
-</ds:datastoreItem>
 </file>
</xml_diff>